<commit_message>
Update developer guide and diagrams
</commit_message>
<xml_diff>
--- a/docs/diagrams/Diagrams.pptx
+++ b/docs/diagrams/Diagrams.pptx
@@ -216,7 +216,7 @@
           <a:p>
             <a:fld id="{F5CC4B3F-88C1-4FFA-B1B6-F41C21DC6924}" type="datetimeFigureOut">
               <a:rPr lang="en-US" smtClean="0"/>
-              <a:t>10/13/16</a:t>
+              <a:t>10/14/16</a:t>
             </a:fld>
             <a:endParaRPr lang="en-US"/>
           </a:p>
@@ -665,7 +665,7 @@
           <a:p>
             <a:fld id="{78C97017-6FC3-485B-9764-EAC9E56C1D49}" type="datetimeFigureOut">
               <a:rPr lang="en-US" smtClean="0"/>
-              <a:t>10/13/16</a:t>
+              <a:t>10/14/16</a:t>
             </a:fld>
             <a:endParaRPr lang="en-US"/>
           </a:p>
@@ -835,7 +835,7 @@
           <a:p>
             <a:fld id="{78C97017-6FC3-485B-9764-EAC9E56C1D49}" type="datetimeFigureOut">
               <a:rPr lang="en-US" smtClean="0"/>
-              <a:t>10/13/16</a:t>
+              <a:t>10/14/16</a:t>
             </a:fld>
             <a:endParaRPr lang="en-US"/>
           </a:p>
@@ -1015,7 +1015,7 @@
           <a:p>
             <a:fld id="{78C97017-6FC3-485B-9764-EAC9E56C1D49}" type="datetimeFigureOut">
               <a:rPr lang="en-US" smtClean="0"/>
-              <a:t>10/13/16</a:t>
+              <a:t>10/14/16</a:t>
             </a:fld>
             <a:endParaRPr lang="en-US"/>
           </a:p>
@@ -1185,7 +1185,7 @@
           <a:p>
             <a:fld id="{78C97017-6FC3-485B-9764-EAC9E56C1D49}" type="datetimeFigureOut">
               <a:rPr lang="en-US" smtClean="0"/>
-              <a:t>10/13/16</a:t>
+              <a:t>10/14/16</a:t>
             </a:fld>
             <a:endParaRPr lang="en-US"/>
           </a:p>
@@ -1431,7 +1431,7 @@
           <a:p>
             <a:fld id="{78C97017-6FC3-485B-9764-EAC9E56C1D49}" type="datetimeFigureOut">
               <a:rPr lang="en-US" smtClean="0"/>
-              <a:t>10/13/16</a:t>
+              <a:t>10/14/16</a:t>
             </a:fld>
             <a:endParaRPr lang="en-US"/>
           </a:p>
@@ -1719,7 +1719,7 @@
           <a:p>
             <a:fld id="{78C97017-6FC3-485B-9764-EAC9E56C1D49}" type="datetimeFigureOut">
               <a:rPr lang="en-US" smtClean="0"/>
-              <a:t>10/13/16</a:t>
+              <a:t>10/14/16</a:t>
             </a:fld>
             <a:endParaRPr lang="en-US"/>
           </a:p>
@@ -2141,7 +2141,7 @@
           <a:p>
             <a:fld id="{78C97017-6FC3-485B-9764-EAC9E56C1D49}" type="datetimeFigureOut">
               <a:rPr lang="en-US" smtClean="0"/>
-              <a:t>10/13/16</a:t>
+              <a:t>10/14/16</a:t>
             </a:fld>
             <a:endParaRPr lang="en-US"/>
           </a:p>
@@ -2259,7 +2259,7 @@
           <a:p>
             <a:fld id="{78C97017-6FC3-485B-9764-EAC9E56C1D49}" type="datetimeFigureOut">
               <a:rPr lang="en-US" smtClean="0"/>
-              <a:t>10/13/16</a:t>
+              <a:t>10/14/16</a:t>
             </a:fld>
             <a:endParaRPr lang="en-US"/>
           </a:p>
@@ -2354,7 +2354,7 @@
           <a:p>
             <a:fld id="{78C97017-6FC3-485B-9764-EAC9E56C1D49}" type="datetimeFigureOut">
               <a:rPr lang="en-US" smtClean="0"/>
-              <a:t>10/13/16</a:t>
+              <a:t>10/14/16</a:t>
             </a:fld>
             <a:endParaRPr lang="en-US"/>
           </a:p>
@@ -2631,7 +2631,7 @@
           <a:p>
             <a:fld id="{78C97017-6FC3-485B-9764-EAC9E56C1D49}" type="datetimeFigureOut">
               <a:rPr lang="en-US" smtClean="0"/>
-              <a:t>10/13/16</a:t>
+              <a:t>10/14/16</a:t>
             </a:fld>
             <a:endParaRPr lang="en-US"/>
           </a:p>
@@ -2884,7 +2884,7 @@
           <a:p>
             <a:fld id="{78C97017-6FC3-485B-9764-EAC9E56C1D49}" type="datetimeFigureOut">
               <a:rPr lang="en-US" smtClean="0"/>
-              <a:t>10/13/16</a:t>
+              <a:t>10/14/16</a:t>
             </a:fld>
             <a:endParaRPr lang="en-US"/>
           </a:p>
@@ -3097,7 +3097,7 @@
           <a:p>
             <a:fld id="{78C97017-6FC3-485B-9764-EAC9E56C1D49}" type="datetimeFigureOut">
               <a:rPr lang="en-US" smtClean="0"/>
-              <a:t>10/13/16</a:t>
+              <a:t>10/14/16</a:t>
             </a:fld>
             <a:endParaRPr lang="en-US"/>
           </a:p>
@@ -5769,7 +5769,15 @@
                   <a:srgbClr val="7030A0"/>
                 </a:solidFill>
               </a:rPr>
-              <a:t>deletePerson</a:t>
+              <a:t>delete</a:t>
+            </a:r>
+            <a:r>
+              <a:rPr lang="en-US" altLang="zh-CN" sz="1400" dirty="0" err="1" smtClean="0">
+                <a:solidFill>
+                  <a:srgbClr val="7030A0"/>
+                </a:solidFill>
+              </a:rPr>
+              <a:t>Task</a:t>
             </a:r>
             <a:r>
               <a:rPr lang="en-US" sz="1400" dirty="0" smtClean="0">
@@ -5777,7 +5785,23 @@
                   <a:srgbClr val="7030A0"/>
                 </a:solidFill>
               </a:rPr>
-              <a:t>(p)</a:t>
+              <a:t>(</a:t>
+            </a:r>
+            <a:r>
+              <a:rPr lang="en-US" altLang="zh-CN" sz="1400" dirty="0" smtClean="0">
+                <a:solidFill>
+                  <a:srgbClr val="7030A0"/>
+                </a:solidFill>
+              </a:rPr>
+              <a:t>task</a:t>
+            </a:r>
+            <a:r>
+              <a:rPr lang="en-US" sz="1400" dirty="0" smtClean="0">
+                <a:solidFill>
+                  <a:srgbClr val="7030A0"/>
+                </a:solidFill>
+              </a:rPr>
+              <a:t>)</a:t>
             </a:r>
             <a:endParaRPr lang="en-US" sz="1400" dirty="0">
               <a:solidFill>
@@ -8157,17 +8181,7 @@
                   </a:schemeClr>
                 </a:solidFill>
               </a:rPr>
-              <a:t>Task</a:t>
-            </a:r>
-            <a:r>
-              <a:rPr lang="en-US" sz="1050" b="1" dirty="0" err="1" smtClean="0">
-                <a:solidFill>
-                  <a:schemeClr val="accent3">
-                    <a:lumMod val="75000"/>
-                  </a:schemeClr>
-                </a:solidFill>
-              </a:rPr>
-              <a:t>ListPanel</a:t>
+              <a:t>TaskListPanel</a:t>
             </a:r>
             <a:endParaRPr lang="en-SG" sz="1050" b="1" dirty="0">
               <a:solidFill>
@@ -10281,15 +10295,7 @@
                   <a:srgbClr val="0070C0"/>
                 </a:solidFill>
               </a:rPr>
-              <a:t>Find</a:t>
-            </a:r>
-            <a:r>
-              <a:rPr lang="en-US" sz="1050" b="1" dirty="0" err="1" smtClean="0">
-                <a:solidFill>
-                  <a:srgbClr val="0070C0"/>
-                </a:solidFill>
-              </a:rPr>
-              <a:t>Command</a:t>
+              <a:t>FindCommand</a:t>
             </a:r>
             <a:endParaRPr lang="en-SG" sz="1050" b="1" dirty="0">
               <a:solidFill>
@@ -12838,15 +12844,7 @@
                   <a:srgbClr val="7030A0"/>
                 </a:solidFill>
               </a:rPr>
-              <a:t>(p</a:t>
-            </a:r>
-            <a:r>
-              <a:rPr lang="en-US" dirty="0" smtClean="0">
-                <a:solidFill>
-                  <a:srgbClr val="7030A0"/>
-                </a:solidFill>
-              </a:rPr>
-              <a:t>)</a:t>
+              <a:t>(p)</a:t>
             </a:r>
             <a:endParaRPr lang="en-US" dirty="0">
               <a:solidFill>

</xml_diff>

<commit_message>
merged master into branch
</commit_message>
<xml_diff>
--- a/docs/diagrams/Diagrams.pptx
+++ b/docs/diagrams/Diagrams.pptx
@@ -115,6 +115,22 @@
       </a:defRPr>
     </a:lvl9pPr>
   </p:defaultTextStyle>
+  <p:extLst>
+    <p:ext uri="{EFAFB233-063F-42B5-8137-9DF3F51BA10A}">
+      <p15:sldGuideLst xmlns:p15="http://schemas.microsoft.com/office/powerpoint/2012/main">
+        <p15:guide id="1" orient="horz" pos="1488">
+          <p15:clr>
+            <a:srgbClr val="A4A3A4"/>
+          </p15:clr>
+        </p15:guide>
+        <p15:guide id="2" pos="2880">
+          <p15:clr>
+            <a:srgbClr val="A4A3A4"/>
+          </p15:clr>
+        </p15:guide>
+      </p15:sldGuideLst>
+    </p:ext>
+  </p:extLst>
 </p:presentation>
 </file>
 
@@ -200,7 +216,7 @@
           <a:p>
             <a:fld id="{F5CC4B3F-88C1-4FFA-B1B6-F41C21DC6924}" type="datetimeFigureOut">
               <a:rPr lang="en-US" smtClean="0"/>
-              <a:t>9/30/2016</a:t>
+              <a:t>10/14/16</a:t>
             </a:fld>
             <a:endParaRPr lang="en-US"/>
           </a:p>
@@ -649,7 +665,7 @@
           <a:p>
             <a:fld id="{78C97017-6FC3-485B-9764-EAC9E56C1D49}" type="datetimeFigureOut">
               <a:rPr lang="en-US" smtClean="0"/>
-              <a:t>9/30/2016</a:t>
+              <a:t>10/14/16</a:t>
             </a:fld>
             <a:endParaRPr lang="en-US"/>
           </a:p>
@@ -819,7 +835,7 @@
           <a:p>
             <a:fld id="{78C97017-6FC3-485B-9764-EAC9E56C1D49}" type="datetimeFigureOut">
               <a:rPr lang="en-US" smtClean="0"/>
-              <a:t>9/30/2016</a:t>
+              <a:t>10/14/16</a:t>
             </a:fld>
             <a:endParaRPr lang="en-US"/>
           </a:p>
@@ -999,7 +1015,7 @@
           <a:p>
             <a:fld id="{78C97017-6FC3-485B-9764-EAC9E56C1D49}" type="datetimeFigureOut">
               <a:rPr lang="en-US" smtClean="0"/>
-              <a:t>9/30/2016</a:t>
+              <a:t>10/14/16</a:t>
             </a:fld>
             <a:endParaRPr lang="en-US"/>
           </a:p>
@@ -1169,7 +1185,7 @@
           <a:p>
             <a:fld id="{78C97017-6FC3-485B-9764-EAC9E56C1D49}" type="datetimeFigureOut">
               <a:rPr lang="en-US" smtClean="0"/>
-              <a:t>9/30/2016</a:t>
+              <a:t>10/14/16</a:t>
             </a:fld>
             <a:endParaRPr lang="en-US"/>
           </a:p>
@@ -1415,7 +1431,7 @@
           <a:p>
             <a:fld id="{78C97017-6FC3-485B-9764-EAC9E56C1D49}" type="datetimeFigureOut">
               <a:rPr lang="en-US" smtClean="0"/>
-              <a:t>9/30/2016</a:t>
+              <a:t>10/14/16</a:t>
             </a:fld>
             <a:endParaRPr lang="en-US"/>
           </a:p>
@@ -1703,7 +1719,7 @@
           <a:p>
             <a:fld id="{78C97017-6FC3-485B-9764-EAC9E56C1D49}" type="datetimeFigureOut">
               <a:rPr lang="en-US" smtClean="0"/>
-              <a:t>9/30/2016</a:t>
+              <a:t>10/14/16</a:t>
             </a:fld>
             <a:endParaRPr lang="en-US"/>
           </a:p>
@@ -2125,7 +2141,7 @@
           <a:p>
             <a:fld id="{78C97017-6FC3-485B-9764-EAC9E56C1D49}" type="datetimeFigureOut">
               <a:rPr lang="en-US" smtClean="0"/>
-              <a:t>9/30/2016</a:t>
+              <a:t>10/14/16</a:t>
             </a:fld>
             <a:endParaRPr lang="en-US"/>
           </a:p>
@@ -2243,7 +2259,7 @@
           <a:p>
             <a:fld id="{78C97017-6FC3-485B-9764-EAC9E56C1D49}" type="datetimeFigureOut">
               <a:rPr lang="en-US" smtClean="0"/>
-              <a:t>9/30/2016</a:t>
+              <a:t>10/14/16</a:t>
             </a:fld>
             <a:endParaRPr lang="en-US"/>
           </a:p>
@@ -2338,7 +2354,7 @@
           <a:p>
             <a:fld id="{78C97017-6FC3-485B-9764-EAC9E56C1D49}" type="datetimeFigureOut">
               <a:rPr lang="en-US" smtClean="0"/>
-              <a:t>9/30/2016</a:t>
+              <a:t>10/14/16</a:t>
             </a:fld>
             <a:endParaRPr lang="en-US"/>
           </a:p>
@@ -2615,7 +2631,7 @@
           <a:p>
             <a:fld id="{78C97017-6FC3-485B-9764-EAC9E56C1D49}" type="datetimeFigureOut">
               <a:rPr lang="en-US" smtClean="0"/>
-              <a:t>9/30/2016</a:t>
+              <a:t>10/14/16</a:t>
             </a:fld>
             <a:endParaRPr lang="en-US"/>
           </a:p>
@@ -2868,7 +2884,7 @@
           <a:p>
             <a:fld id="{78C97017-6FC3-485B-9764-EAC9E56C1D49}" type="datetimeFigureOut">
               <a:rPr lang="en-US" smtClean="0"/>
-              <a:t>9/30/2016</a:t>
+              <a:t>10/14/16</a:t>
             </a:fld>
             <a:endParaRPr lang="en-US"/>
           </a:p>
@@ -3081,7 +3097,7 @@
           <a:p>
             <a:fld id="{78C97017-6FC3-485B-9764-EAC9E56C1D49}" type="datetimeFigureOut">
               <a:rPr lang="en-US" smtClean="0"/>
-              <a:t>9/30/2016</a:t>
+              <a:t>10/14/16</a:t>
             </a:fld>
             <a:endParaRPr lang="en-US"/>
           </a:p>
@@ -5753,7 +5769,15 @@
                   <a:srgbClr val="7030A0"/>
                 </a:solidFill>
               </a:rPr>
-              <a:t>deletePerson</a:t>
+              <a:t>delete</a:t>
+            </a:r>
+            <a:r>
+              <a:rPr lang="en-US" altLang="zh-CN" sz="1400" dirty="0" err="1" smtClean="0">
+                <a:solidFill>
+                  <a:srgbClr val="7030A0"/>
+                </a:solidFill>
+              </a:rPr>
+              <a:t>Task</a:t>
             </a:r>
             <a:r>
               <a:rPr lang="en-US" sz="1400" dirty="0" smtClean="0">
@@ -5761,7 +5785,23 @@
                   <a:srgbClr val="7030A0"/>
                 </a:solidFill>
               </a:rPr>
-              <a:t>(p)</a:t>
+              <a:t>(</a:t>
+            </a:r>
+            <a:r>
+              <a:rPr lang="en-US" altLang="zh-CN" sz="1400" dirty="0" smtClean="0">
+                <a:solidFill>
+                  <a:srgbClr val="7030A0"/>
+                </a:solidFill>
+              </a:rPr>
+              <a:t>task</a:t>
+            </a:r>
+            <a:r>
+              <a:rPr lang="en-US" sz="1400" dirty="0" smtClean="0">
+                <a:solidFill>
+                  <a:srgbClr val="7030A0"/>
+                </a:solidFill>
+              </a:rPr>
+              <a:t>)</a:t>
             </a:r>
             <a:endParaRPr lang="en-US" sz="1400" dirty="0">
               <a:solidFill>
@@ -5811,7 +5851,7 @@
                   </a:schemeClr>
                 </a:solidFill>
               </a:rPr>
-              <a:t>AddressBookChangedEvent</a:t>
+              <a:t>ToDoListChangedEvent</a:t>
             </a:r>
             <a:r>
               <a:rPr lang="en-US" sz="1400" dirty="0" smtClean="0">
@@ -6385,7 +6425,7 @@
                   </a:schemeClr>
                 </a:solidFill>
               </a:rPr>
-              <a:t>AddressBookChangedEvent</a:t>
+              <a:t>ToDoListChangedEvent</a:t>
             </a:r>
             <a:r>
               <a:rPr lang="en-US" sz="1400" dirty="0" smtClean="0">
@@ -6757,7 +6797,7 @@
                   </a:schemeClr>
                 </a:solidFill>
               </a:rPr>
-              <a:t>handleAddresssBookChangedEvent</a:t>
+              <a:t>handleToDoListChangedEvent</a:t>
             </a:r>
             <a:r>
               <a:rPr lang="en-US" sz="1400" dirty="0" smtClean="0">
@@ -7068,7 +7108,7 @@
                   <a:srgbClr val="00B050"/>
                 </a:solidFill>
               </a:rPr>
-              <a:t>handleAddresssBookChangedEvent</a:t>
+              <a:t>handleToDoListChangedEvent</a:t>
             </a:r>
             <a:r>
               <a:rPr lang="en-US" sz="1400" dirty="0" smtClean="0">
@@ -8134,14 +8174,14 @@
           <a:p>
             <a:pPr algn="ctr"/>
             <a:r>
-              <a:rPr lang="en-US" sz="1050" b="1" dirty="0" err="1">
+              <a:rPr lang="en-US" sz="1050" b="1" dirty="0" err="1" smtClean="0">
                 <a:solidFill>
                   <a:schemeClr val="accent3">
                     <a:lumMod val="75000"/>
                   </a:schemeClr>
                 </a:solidFill>
               </a:rPr>
-              <a:t>PersonListPanel</a:t>
+              <a:t>TaskListPanel</a:t>
             </a:r>
             <a:endParaRPr lang="en-SG" sz="1050" b="1" dirty="0">
               <a:solidFill>
@@ -8194,14 +8234,14 @@
           <a:p>
             <a:pPr algn="ctr"/>
             <a:r>
-              <a:rPr lang="en-US" sz="1050" b="1" dirty="0" err="1">
+              <a:rPr lang="en-US" sz="1050" b="1" dirty="0" err="1" smtClean="0">
                 <a:solidFill>
                   <a:schemeClr val="accent3">
                     <a:lumMod val="75000"/>
                   </a:schemeClr>
                 </a:solidFill>
               </a:rPr>
-              <a:t>PersonCard</a:t>
+              <a:t>TaskCard</a:t>
             </a:r>
             <a:endParaRPr lang="en-SG" sz="1050" b="1" dirty="0">
               <a:solidFill>
@@ -10250,12 +10290,12 @@
           <a:p>
             <a:pPr algn="ctr"/>
             <a:r>
-              <a:rPr lang="en-US" sz="1050" b="1" dirty="0" err="1">
+              <a:rPr lang="en-US" sz="1050" b="1" dirty="0" err="1" smtClean="0">
                 <a:solidFill>
                   <a:srgbClr val="0070C0"/>
                 </a:solidFill>
               </a:rPr>
-              <a:t>ListCommand</a:t>
+              <a:t>FindCommand</a:t>
             </a:r>
             <a:endParaRPr lang="en-SG" sz="1050" b="1" dirty="0">
               <a:solidFill>
@@ -12280,7 +12320,6 @@
               <a:rPr lang="en-US" dirty="0"/>
               <a:t>execute()</a:t>
             </a:r>
-            <a:endParaRPr lang="en-US" dirty="0"/>
           </a:p>
         </p:txBody>
       </p:sp>
@@ -12797,7 +12836,7 @@
                   <a:srgbClr val="7030A0"/>
                 </a:solidFill>
               </a:rPr>
-              <a:t>deletePerson</a:t>
+              <a:t>deleteTask</a:t>
             </a:r>
             <a:r>
               <a:rPr lang="en-US" dirty="0" smtClean="0">
@@ -13936,7 +13975,7 @@
                   <a:srgbClr val="7030A0"/>
                 </a:solidFill>
               </a:rPr>
-              <a:t>AddressBook</a:t>
+              <a:t>ToDoList</a:t>
             </a:r>
             <a:endParaRPr lang="en-SG" sz="1050" dirty="0">
               <a:solidFill>
@@ -14078,7 +14117,7 @@
                   <a:srgbClr val="7030A0"/>
                 </a:solidFill>
               </a:rPr>
-              <a:t>UniquePersonList</a:t>
+              <a:t>UniqueTaskList</a:t>
             </a:r>
             <a:endParaRPr lang="en-SG" sz="1050" dirty="0">
               <a:solidFill>
@@ -14321,7 +14360,7 @@
                   <a:srgbClr val="7030A0"/>
                 </a:solidFill>
               </a:rPr>
-              <a:t>Person</a:t>
+              <a:t>Task</a:t>
             </a:r>
             <a:endParaRPr lang="en-SG" sz="1050" dirty="0">
               <a:solidFill>
@@ -14620,7 +14659,7 @@
                   <a:srgbClr val="7030A0"/>
                 </a:solidFill>
               </a:rPr>
-              <a:t>ReadOnlyPerson</a:t>
+              <a:t>ReadOnlyTask</a:t>
             </a:r>
             <a:endParaRPr lang="en-SG" sz="1050" dirty="0">
               <a:solidFill>
@@ -14638,7 +14677,7 @@
         </p:nvSpPr>
         <p:spPr>
           <a:xfrm>
-            <a:off x="7712397" y="2564238"/>
+            <a:off x="7694900" y="2897160"/>
             <a:ext cx="708186" cy="285783"/>
           </a:xfrm>
           <a:prstGeom prst="rect">
@@ -14735,308 +14774,14 @@
       </p:sp>
       <p:cxnSp>
         <p:nvCxnSpPr>
-          <p:cNvPr id="79" name="Elbow Connector 78"/>
-          <p:cNvCxnSpPr>
-            <a:stCxn id="78" idx="3"/>
-            <a:endCxn id="76" idx="1"/>
-          </p:cNvCxnSpPr>
+          <p:cNvPr id="81" name="Elbow Connector 80"/>
+          <p:cNvCxnSpPr/>
           <p:nvPr/>
         </p:nvCxnSpPr>
         <p:spPr>
           <a:xfrm flipV="1">
-            <a:off x="7277995" y="2707130"/>
-            <a:ext cx="434402" cy="327761"/>
-          </a:xfrm>
-          <a:prstGeom prst="bentConnector3">
-            <a:avLst/>
-          </a:prstGeom>
-          <a:ln w="19050">
-            <a:solidFill>
-              <a:srgbClr val="7030A0"/>
-            </a:solidFill>
-            <a:headEnd type="none" w="med" len="med"/>
-            <a:tailEnd type="arrow" w="med" len="med"/>
-          </a:ln>
-          <a:effectLst/>
-        </p:spPr>
-        <p:style>
-          <a:lnRef idx="1">
-            <a:schemeClr val="accent2"/>
-          </a:lnRef>
-          <a:fillRef idx="2">
-            <a:schemeClr val="accent2"/>
-          </a:fillRef>
-          <a:effectRef idx="1">
-            <a:schemeClr val="accent2"/>
-          </a:effectRef>
-          <a:fontRef idx="minor">
-            <a:schemeClr val="dk1"/>
-          </a:fontRef>
-        </p:style>
-      </p:cxnSp>
-      <p:sp>
-        <p:nvSpPr>
-          <p:cNvPr id="80" name="Rectangle 8"/>
-          <p:cNvSpPr/>
-          <p:nvPr/>
-        </p:nvSpPr>
-        <p:spPr>
-          <a:xfrm>
-            <a:off x="7712397" y="2887216"/>
-            <a:ext cx="708186" cy="285783"/>
-          </a:xfrm>
-          <a:prstGeom prst="rect">
-            <a:avLst/>
-          </a:prstGeom>
-          <a:ln w="19050">
-            <a:solidFill>
-              <a:srgbClr val="7030A0"/>
-            </a:solidFill>
-          </a:ln>
-          <a:effectLst/>
-        </p:spPr>
-        <p:style>
-          <a:lnRef idx="1">
-            <a:schemeClr val="accent4"/>
-          </a:lnRef>
-          <a:fillRef idx="2">
-            <a:schemeClr val="accent4"/>
-          </a:fillRef>
-          <a:effectRef idx="1">
-            <a:schemeClr val="accent4"/>
-          </a:effectRef>
-          <a:fontRef idx="minor">
-            <a:schemeClr val="dk1"/>
-          </a:fontRef>
-        </p:style>
-        <p:txBody>
-          <a:bodyPr rtlCol="0" anchor="ctr"/>
-          <a:lstStyle/>
-          <a:p>
-            <a:pPr algn="ctr"/>
-            <a:r>
-              <a:rPr lang="en-US" sz="1050" dirty="0" smtClean="0">
-                <a:solidFill>
-                  <a:srgbClr val="7030A0"/>
-                </a:solidFill>
-              </a:rPr>
-              <a:t>Phone</a:t>
-            </a:r>
-            <a:endParaRPr lang="en-SG" sz="1050" dirty="0">
-              <a:solidFill>
-                <a:srgbClr val="7030A0"/>
-              </a:solidFill>
-            </a:endParaRPr>
-          </a:p>
-        </p:txBody>
-      </p:sp>
-      <p:cxnSp>
-        <p:nvCxnSpPr>
-          <p:cNvPr id="81" name="Elbow Connector 80"/>
-          <p:cNvCxnSpPr>
-            <a:stCxn id="78" idx="3"/>
-            <a:endCxn id="80" idx="1"/>
-          </p:cNvCxnSpPr>
-          <p:nvPr/>
-        </p:nvCxnSpPr>
-        <p:spPr>
-          <a:xfrm flipV="1">
-            <a:off x="7277995" y="3030108"/>
+            <a:off x="7292440" y="3040052"/>
             <a:ext cx="434402" cy="4783"/>
-          </a:xfrm>
-          <a:prstGeom prst="bentConnector3">
-            <a:avLst/>
-          </a:prstGeom>
-          <a:ln w="19050">
-            <a:solidFill>
-              <a:srgbClr val="7030A0"/>
-            </a:solidFill>
-            <a:headEnd type="none" w="med" len="med"/>
-            <a:tailEnd type="arrow" w="med" len="med"/>
-          </a:ln>
-          <a:effectLst/>
-        </p:spPr>
-        <p:style>
-          <a:lnRef idx="1">
-            <a:schemeClr val="accent2"/>
-          </a:lnRef>
-          <a:fillRef idx="2">
-            <a:schemeClr val="accent2"/>
-          </a:fillRef>
-          <a:effectRef idx="1">
-            <a:schemeClr val="accent2"/>
-          </a:effectRef>
-          <a:fontRef idx="minor">
-            <a:schemeClr val="dk1"/>
-          </a:fontRef>
-        </p:style>
-      </p:cxnSp>
-      <p:sp>
-        <p:nvSpPr>
-          <p:cNvPr id="83" name="Rectangle 8"/>
-          <p:cNvSpPr/>
-          <p:nvPr/>
-        </p:nvSpPr>
-        <p:spPr>
-          <a:xfrm>
-            <a:off x="7712397" y="3210194"/>
-            <a:ext cx="708186" cy="285783"/>
-          </a:xfrm>
-          <a:prstGeom prst="rect">
-            <a:avLst/>
-          </a:prstGeom>
-          <a:ln w="19050">
-            <a:solidFill>
-              <a:srgbClr val="7030A0"/>
-            </a:solidFill>
-          </a:ln>
-          <a:effectLst/>
-        </p:spPr>
-        <p:style>
-          <a:lnRef idx="1">
-            <a:schemeClr val="accent4"/>
-          </a:lnRef>
-          <a:fillRef idx="2">
-            <a:schemeClr val="accent4"/>
-          </a:fillRef>
-          <a:effectRef idx="1">
-            <a:schemeClr val="accent4"/>
-          </a:effectRef>
-          <a:fontRef idx="minor">
-            <a:schemeClr val="dk1"/>
-          </a:fontRef>
-        </p:style>
-        <p:txBody>
-          <a:bodyPr rtlCol="0" anchor="ctr"/>
-          <a:lstStyle/>
-          <a:p>
-            <a:pPr algn="ctr"/>
-            <a:r>
-              <a:rPr lang="en-US" sz="1050" dirty="0" smtClean="0">
-                <a:solidFill>
-                  <a:srgbClr val="7030A0"/>
-                </a:solidFill>
-              </a:rPr>
-              <a:t>Email</a:t>
-            </a:r>
-            <a:endParaRPr lang="en-SG" sz="1050" dirty="0">
-              <a:solidFill>
-                <a:srgbClr val="7030A0"/>
-              </a:solidFill>
-            </a:endParaRPr>
-          </a:p>
-        </p:txBody>
-      </p:sp>
-      <p:cxnSp>
-        <p:nvCxnSpPr>
-          <p:cNvPr id="84" name="Elbow Connector 83"/>
-          <p:cNvCxnSpPr>
-            <a:stCxn id="78" idx="3"/>
-            <a:endCxn id="83" idx="1"/>
-          </p:cNvCxnSpPr>
-          <p:nvPr/>
-        </p:nvCxnSpPr>
-        <p:spPr>
-          <a:xfrm>
-            <a:off x="7277995" y="3034891"/>
-            <a:ext cx="434402" cy="318195"/>
-          </a:xfrm>
-          <a:prstGeom prst="bentConnector3">
-            <a:avLst/>
-          </a:prstGeom>
-          <a:ln w="19050">
-            <a:solidFill>
-              <a:srgbClr val="7030A0"/>
-            </a:solidFill>
-            <a:headEnd type="none" w="med" len="med"/>
-            <a:tailEnd type="arrow" w="med" len="med"/>
-          </a:ln>
-          <a:effectLst/>
-        </p:spPr>
-        <p:style>
-          <a:lnRef idx="1">
-            <a:schemeClr val="accent2"/>
-          </a:lnRef>
-          <a:fillRef idx="2">
-            <a:schemeClr val="accent2"/>
-          </a:fillRef>
-          <a:effectRef idx="1">
-            <a:schemeClr val="accent2"/>
-          </a:effectRef>
-          <a:fontRef idx="minor">
-            <a:schemeClr val="dk1"/>
-          </a:fontRef>
-        </p:style>
-      </p:cxnSp>
-      <p:sp>
-        <p:nvSpPr>
-          <p:cNvPr id="85" name="Rectangle 8"/>
-          <p:cNvSpPr/>
-          <p:nvPr/>
-        </p:nvSpPr>
-        <p:spPr>
-          <a:xfrm>
-            <a:off x="7712397" y="3533171"/>
-            <a:ext cx="708186" cy="285783"/>
-          </a:xfrm>
-          <a:prstGeom prst="rect">
-            <a:avLst/>
-          </a:prstGeom>
-          <a:ln w="19050">
-            <a:solidFill>
-              <a:srgbClr val="7030A0"/>
-            </a:solidFill>
-          </a:ln>
-          <a:effectLst/>
-        </p:spPr>
-        <p:style>
-          <a:lnRef idx="1">
-            <a:schemeClr val="accent4"/>
-          </a:lnRef>
-          <a:fillRef idx="2">
-            <a:schemeClr val="accent4"/>
-          </a:fillRef>
-          <a:effectRef idx="1">
-            <a:schemeClr val="accent4"/>
-          </a:effectRef>
-          <a:fontRef idx="minor">
-            <a:schemeClr val="dk1"/>
-          </a:fontRef>
-        </p:style>
-        <p:txBody>
-          <a:bodyPr rtlCol="0" anchor="ctr"/>
-          <a:lstStyle/>
-          <a:p>
-            <a:pPr algn="ctr"/>
-            <a:r>
-              <a:rPr lang="en-US" sz="1050" dirty="0" smtClean="0">
-                <a:solidFill>
-                  <a:srgbClr val="7030A0"/>
-                </a:solidFill>
-              </a:rPr>
-              <a:t>Address</a:t>
-            </a:r>
-            <a:endParaRPr lang="en-SG" sz="1050" dirty="0">
-              <a:solidFill>
-                <a:srgbClr val="7030A0"/>
-              </a:solidFill>
-            </a:endParaRPr>
-          </a:p>
-        </p:txBody>
-      </p:sp>
-      <p:cxnSp>
-        <p:nvCxnSpPr>
-          <p:cNvPr id="86" name="Elbow Connector 85"/>
-          <p:cNvCxnSpPr>
-            <a:stCxn id="78" idx="3"/>
-            <a:endCxn id="85" idx="1"/>
-          </p:cNvCxnSpPr>
-          <p:nvPr/>
-        </p:nvCxnSpPr>
-        <p:spPr>
-          <a:xfrm>
-            <a:off x="7277995" y="3034891"/>
-            <a:ext cx="434402" cy="641172"/>
           </a:xfrm>
           <a:prstGeom prst="bentConnector3">
             <a:avLst/>
@@ -15217,7 +14962,7 @@
                   <a:srgbClr val="7030A0"/>
                 </a:solidFill>
               </a:rPr>
-              <a:t>ReadOnlyAddressBook</a:t>
+              <a:t>ReadOnlyToDoList</a:t>
             </a:r>
             <a:endParaRPr lang="en-SG" sz="1050" dirty="0">
               <a:solidFill>
@@ -15557,7 +15302,7 @@
                   <a:schemeClr val="bg1"/>
                 </a:solidFill>
               </a:rPr>
-              <a:t>AddressBookStorage</a:t>
+              <a:t>ToDoListStorage</a:t>
             </a:r>
             <a:endParaRPr lang="en-SG" sz="1050" dirty="0">
               <a:solidFill>
@@ -16130,7 +15875,422 @@
                   </a:schemeClr>
                 </a:solidFill>
               </a:rPr>
-              <a:t>XmlAddressBook</a:t>
+              <a:t>XmlToDoListStorage</a:t>
+            </a:r>
+            <a:endParaRPr lang="en-SG" sz="1050" b="1" dirty="0">
+              <a:solidFill>
+                <a:schemeClr val="accent6">
+                  <a:lumMod val="75000"/>
+                </a:schemeClr>
+              </a:solidFill>
+            </a:endParaRPr>
+          </a:p>
+        </p:txBody>
+      </p:sp>
+      <p:sp>
+        <p:nvSpPr>
+          <p:cNvPr id="52" name="Rectangle 8"/>
+          <p:cNvSpPr/>
+          <p:nvPr/>
+        </p:nvSpPr>
+        <p:spPr>
+          <a:xfrm>
+            <a:off x="2873943" y="2558040"/>
+            <a:ext cx="1323049" cy="346760"/>
+          </a:xfrm>
+          <a:prstGeom prst="rect">
+            <a:avLst/>
+          </a:prstGeom>
+          <a:solidFill>
+            <a:schemeClr val="accent6">
+              <a:lumMod val="75000"/>
+            </a:schemeClr>
+          </a:solidFill>
+          <a:ln w="19050">
+            <a:solidFill>
+              <a:schemeClr val="accent6">
+                <a:lumMod val="75000"/>
+              </a:schemeClr>
+            </a:solidFill>
+          </a:ln>
+          <a:effectLst/>
+        </p:spPr>
+        <p:style>
+          <a:lnRef idx="1">
+            <a:schemeClr val="accent2"/>
+          </a:lnRef>
+          <a:fillRef idx="2">
+            <a:schemeClr val="accent2"/>
+          </a:fillRef>
+          <a:effectRef idx="1">
+            <a:schemeClr val="accent2"/>
+          </a:effectRef>
+          <a:fontRef idx="minor">
+            <a:schemeClr val="dk1"/>
+          </a:fontRef>
+        </p:style>
+        <p:txBody>
+          <a:bodyPr rtlCol="0" anchor="ctr"/>
+          <a:lstStyle/>
+          <a:p>
+            <a:pPr algn="ctr"/>
+            <a:r>
+              <a:rPr lang="en-US" sz="1050" dirty="0" smtClean="0">
+                <a:solidFill>
+                  <a:schemeClr val="bg1"/>
+                </a:solidFill>
+              </a:rPr>
+              <a:t>&lt;&lt;interface&gt;&gt;</a:t>
+            </a:r>
+            <a:br>
+              <a:rPr lang="en-US" sz="1050" dirty="0" smtClean="0">
+                <a:solidFill>
+                  <a:schemeClr val="bg1"/>
+                </a:solidFill>
+              </a:rPr>
+            </a:br>
+            <a:r>
+              <a:rPr lang="en-US" sz="1050" dirty="0" err="1" smtClean="0">
+                <a:solidFill>
+                  <a:schemeClr val="bg1"/>
+                </a:solidFill>
+              </a:rPr>
+              <a:t>UserPrefsStorage</a:t>
+            </a:r>
+            <a:endParaRPr lang="en-SG" sz="1050" dirty="0">
+              <a:solidFill>
+                <a:schemeClr val="bg1"/>
+              </a:solidFill>
+            </a:endParaRPr>
+          </a:p>
+        </p:txBody>
+      </p:sp>
+      <p:cxnSp>
+        <p:nvCxnSpPr>
+          <p:cNvPr id="54" name="Straight Arrow Connector 53"/>
+          <p:cNvCxnSpPr>
+            <a:stCxn id="56" idx="3"/>
+            <a:endCxn id="52" idx="1"/>
+          </p:cNvCxnSpPr>
+          <p:nvPr/>
+        </p:nvCxnSpPr>
+        <p:spPr>
+          <a:xfrm>
+            <a:off x="2653133" y="2726136"/>
+            <a:ext cx="220810" cy="5284"/>
+          </a:xfrm>
+          <a:prstGeom prst="straightConnector1">
+            <a:avLst/>
+          </a:prstGeom>
+          <a:ln w="19050">
+            <a:solidFill>
+              <a:schemeClr val="accent6">
+                <a:lumMod val="75000"/>
+              </a:schemeClr>
+            </a:solidFill>
+            <a:headEnd type="none" w="med" len="med"/>
+            <a:tailEnd type="arrow" w="med" len="med"/>
+          </a:ln>
+          <a:effectLst/>
+        </p:spPr>
+        <p:style>
+          <a:lnRef idx="1">
+            <a:schemeClr val="accent2"/>
+          </a:lnRef>
+          <a:fillRef idx="2">
+            <a:schemeClr val="accent2"/>
+          </a:fillRef>
+          <a:effectRef idx="1">
+            <a:schemeClr val="accent2"/>
+          </a:effectRef>
+          <a:fontRef idx="minor">
+            <a:schemeClr val="dk1"/>
+          </a:fontRef>
+        </p:style>
+      </p:cxnSp>
+      <p:sp>
+        <p:nvSpPr>
+          <p:cNvPr id="56" name="Flowchart: Decision 96"/>
+          <p:cNvSpPr/>
+          <p:nvPr/>
+        </p:nvSpPr>
+        <p:spPr>
+          <a:xfrm>
+            <a:off x="2417085" y="2639446"/>
+            <a:ext cx="236048" cy="173380"/>
+          </a:xfrm>
+          <a:prstGeom prst="flowChartDecision">
+            <a:avLst/>
+          </a:prstGeom>
+          <a:noFill/>
+          <a:ln w="19050">
+            <a:solidFill>
+              <a:schemeClr val="accent6">
+                <a:lumMod val="75000"/>
+              </a:schemeClr>
+            </a:solidFill>
+          </a:ln>
+          <a:effectLst/>
+        </p:spPr>
+        <p:style>
+          <a:lnRef idx="1">
+            <a:schemeClr val="accent2"/>
+          </a:lnRef>
+          <a:fillRef idx="2">
+            <a:schemeClr val="accent2"/>
+          </a:fillRef>
+          <a:effectRef idx="1">
+            <a:schemeClr val="accent2"/>
+          </a:effectRef>
+          <a:fontRef idx="minor">
+            <a:schemeClr val="dk1"/>
+          </a:fontRef>
+        </p:style>
+        <p:txBody>
+          <a:bodyPr rtlCol="0" anchor="ctr"/>
+          <a:lstStyle/>
+          <a:p>
+            <a:pPr algn="ctr"/>
+            <a:endParaRPr lang="en-US" sz="1050">
+              <a:solidFill>
+                <a:schemeClr val="bg1"/>
+              </a:solidFill>
+            </a:endParaRPr>
+          </a:p>
+        </p:txBody>
+      </p:sp>
+      <p:cxnSp>
+        <p:nvCxnSpPr>
+          <p:cNvPr id="60" name="Elbow Connector 63"/>
+          <p:cNvCxnSpPr>
+            <a:stCxn id="61" idx="3"/>
+            <a:endCxn id="65" idx="1"/>
+          </p:cNvCxnSpPr>
+          <p:nvPr/>
+        </p:nvCxnSpPr>
+        <p:spPr>
+          <a:xfrm flipV="1">
+            <a:off x="4394804" y="2731420"/>
+            <a:ext cx="223324" cy="1"/>
+          </a:xfrm>
+          <a:prstGeom prst="bentConnector3">
+            <a:avLst>
+              <a:gd name="adj1" fmla="val 50000"/>
+            </a:avLst>
+          </a:prstGeom>
+          <a:ln w="19050">
+            <a:solidFill>
+              <a:schemeClr val="accent6">
+                <a:lumMod val="75000"/>
+              </a:schemeClr>
+            </a:solidFill>
+            <a:prstDash val="sysDot"/>
+            <a:headEnd type="none" w="med" len="med"/>
+            <a:tailEnd type="none" w="med" len="med"/>
+          </a:ln>
+          <a:effectLst/>
+        </p:spPr>
+        <p:style>
+          <a:lnRef idx="1">
+            <a:schemeClr val="accent2"/>
+          </a:lnRef>
+          <a:fillRef idx="2">
+            <a:schemeClr val="accent2"/>
+          </a:fillRef>
+          <a:effectRef idx="1">
+            <a:schemeClr val="accent2"/>
+          </a:effectRef>
+          <a:fontRef idx="minor">
+            <a:schemeClr val="dk1"/>
+          </a:fontRef>
+        </p:style>
+      </p:cxnSp>
+      <p:sp>
+        <p:nvSpPr>
+          <p:cNvPr id="61" name="Isosceles Triangle 102"/>
+          <p:cNvSpPr/>
+          <p:nvPr/>
+        </p:nvSpPr>
+        <p:spPr>
+          <a:xfrm rot="5400000" flipV="1">
+            <a:off x="4171790" y="2643659"/>
+            <a:ext cx="270504" cy="175523"/>
+          </a:xfrm>
+          <a:prstGeom prst="triangle">
+            <a:avLst/>
+          </a:prstGeom>
+          <a:solidFill>
+            <a:schemeClr val="accent6">
+              <a:lumMod val="75000"/>
+            </a:schemeClr>
+          </a:solidFill>
+          <a:ln w="19050">
+            <a:solidFill>
+              <a:schemeClr val="accent6">
+                <a:lumMod val="75000"/>
+              </a:schemeClr>
+            </a:solidFill>
+          </a:ln>
+          <a:effectLst/>
+        </p:spPr>
+        <p:style>
+          <a:lnRef idx="1">
+            <a:schemeClr val="accent2"/>
+          </a:lnRef>
+          <a:fillRef idx="2">
+            <a:schemeClr val="accent2"/>
+          </a:fillRef>
+          <a:effectRef idx="1">
+            <a:schemeClr val="accent2"/>
+          </a:effectRef>
+          <a:fontRef idx="minor">
+            <a:schemeClr val="dk1"/>
+          </a:fontRef>
+        </p:style>
+        <p:txBody>
+          <a:bodyPr rtlCol="0" anchor="ctr"/>
+          <a:lstStyle/>
+          <a:p>
+            <a:pPr algn="ctr"/>
+            <a:endParaRPr lang="en-SG" sz="1050">
+              <a:solidFill>
+                <a:schemeClr val="bg1"/>
+              </a:solidFill>
+            </a:endParaRPr>
+          </a:p>
+        </p:txBody>
+      </p:sp>
+      <p:sp>
+        <p:nvSpPr>
+          <p:cNvPr id="65" name="Rectangle 8"/>
+          <p:cNvSpPr/>
+          <p:nvPr/>
+        </p:nvSpPr>
+        <p:spPr>
+          <a:xfrm>
+            <a:off x="4618128" y="2558040"/>
+            <a:ext cx="1093635" cy="346760"/>
+          </a:xfrm>
+          <a:prstGeom prst="rect">
+            <a:avLst/>
+          </a:prstGeom>
+          <a:solidFill>
+            <a:schemeClr val="accent6">
+              <a:lumMod val="75000"/>
+            </a:schemeClr>
+          </a:solidFill>
+          <a:ln w="19050">
+            <a:solidFill>
+              <a:schemeClr val="accent6">
+                <a:lumMod val="75000"/>
+              </a:schemeClr>
+            </a:solidFill>
+          </a:ln>
+          <a:effectLst/>
+        </p:spPr>
+        <p:style>
+          <a:lnRef idx="1">
+            <a:schemeClr val="accent2"/>
+          </a:lnRef>
+          <a:fillRef idx="2">
+            <a:schemeClr val="accent2"/>
+          </a:fillRef>
+          <a:effectRef idx="1">
+            <a:schemeClr val="accent2"/>
+          </a:effectRef>
+          <a:fontRef idx="minor">
+            <a:schemeClr val="dk1"/>
+          </a:fontRef>
+        </p:style>
+        <p:txBody>
+          <a:bodyPr rtlCol="0" anchor="ctr"/>
+          <a:lstStyle/>
+          <a:p>
+            <a:pPr algn="ctr"/>
+            <a:r>
+              <a:rPr lang="en-US" sz="1050" dirty="0" err="1" smtClean="0">
+                <a:solidFill>
+                  <a:schemeClr val="bg1"/>
+                </a:solidFill>
+              </a:rPr>
+              <a:t>JsonUserPrefs</a:t>
+            </a:r>
+            <a:r>
+              <a:rPr lang="en-US" sz="1050" dirty="0" smtClean="0">
+                <a:solidFill>
+                  <a:schemeClr val="bg1"/>
+                </a:solidFill>
+              </a:rPr>
+              <a:t/>
+            </a:r>
+            <a:br>
+              <a:rPr lang="en-US" sz="1050" dirty="0" smtClean="0">
+                <a:solidFill>
+                  <a:schemeClr val="bg1"/>
+                </a:solidFill>
+              </a:rPr>
+            </a:br>
+            <a:r>
+              <a:rPr lang="en-US" sz="1050" dirty="0" smtClean="0">
+                <a:solidFill>
+                  <a:schemeClr val="bg1"/>
+                </a:solidFill>
+              </a:rPr>
+              <a:t>Storage</a:t>
+            </a:r>
+            <a:endParaRPr lang="en-SG" sz="1050" dirty="0">
+              <a:solidFill>
+                <a:schemeClr val="bg1"/>
+              </a:solidFill>
+            </a:endParaRPr>
+          </a:p>
+        </p:txBody>
+      </p:sp>
+      <p:sp>
+        <p:nvSpPr>
+          <p:cNvPr id="66" name="Rectangle 8"/>
+          <p:cNvSpPr/>
+          <p:nvPr/>
+        </p:nvSpPr>
+        <p:spPr>
+          <a:xfrm>
+            <a:off x="6019800" y="3160410"/>
+            <a:ext cx="1200707" cy="346760"/>
+          </a:xfrm>
+          <a:prstGeom prst="rect">
+            <a:avLst/>
+          </a:prstGeom>
+          <a:ln w="19050"/>
+          <a:effectLst/>
+        </p:spPr>
+        <p:style>
+          <a:lnRef idx="1">
+            <a:schemeClr val="accent6"/>
+          </a:lnRef>
+          <a:fillRef idx="2">
+            <a:schemeClr val="accent6"/>
+          </a:fillRef>
+          <a:effectRef idx="1">
+            <a:schemeClr val="accent6"/>
+          </a:effectRef>
+          <a:fontRef idx="minor">
+            <a:schemeClr val="dk1"/>
+          </a:fontRef>
+        </p:style>
+        <p:txBody>
+          <a:bodyPr rtlCol="0" anchor="ctr"/>
+          <a:lstStyle/>
+          <a:p>
+            <a:pPr algn="ctr"/>
+            <a:r>
+              <a:rPr lang="en-US" sz="1050" b="1" dirty="0" err="1" smtClean="0">
+                <a:solidFill>
+                  <a:schemeClr val="accent6">
+                    <a:lumMod val="75000"/>
+                  </a:schemeClr>
+                </a:solidFill>
+              </a:rPr>
+              <a:t>XmlSerializable</a:t>
             </a:r>
             <a:r>
               <a:rPr lang="en-US" sz="1050" b="1" dirty="0" smtClean="0">
@@ -16152,421 +16312,6 @@
               </a:rPr>
             </a:br>
             <a:r>
-              <a:rPr lang="en-US" sz="1050" b="1" dirty="0" smtClean="0">
-                <a:solidFill>
-                  <a:schemeClr val="accent6">
-                    <a:lumMod val="75000"/>
-                  </a:schemeClr>
-                </a:solidFill>
-              </a:rPr>
-              <a:t>Storage</a:t>
-            </a:r>
-            <a:endParaRPr lang="en-SG" sz="1050" b="1" dirty="0">
-              <a:solidFill>
-                <a:schemeClr val="accent6">
-                  <a:lumMod val="75000"/>
-                </a:schemeClr>
-              </a:solidFill>
-            </a:endParaRPr>
-          </a:p>
-        </p:txBody>
-      </p:sp>
-      <p:sp>
-        <p:nvSpPr>
-          <p:cNvPr id="52" name="Rectangle 8"/>
-          <p:cNvSpPr/>
-          <p:nvPr/>
-        </p:nvSpPr>
-        <p:spPr>
-          <a:xfrm>
-            <a:off x="2873943" y="2558040"/>
-            <a:ext cx="1323049" cy="346760"/>
-          </a:xfrm>
-          <a:prstGeom prst="rect">
-            <a:avLst/>
-          </a:prstGeom>
-          <a:solidFill>
-            <a:schemeClr val="accent6">
-              <a:lumMod val="75000"/>
-            </a:schemeClr>
-          </a:solidFill>
-          <a:ln w="19050">
-            <a:solidFill>
-              <a:schemeClr val="accent6">
-                <a:lumMod val="75000"/>
-              </a:schemeClr>
-            </a:solidFill>
-          </a:ln>
-          <a:effectLst/>
-        </p:spPr>
-        <p:style>
-          <a:lnRef idx="1">
-            <a:schemeClr val="accent2"/>
-          </a:lnRef>
-          <a:fillRef idx="2">
-            <a:schemeClr val="accent2"/>
-          </a:fillRef>
-          <a:effectRef idx="1">
-            <a:schemeClr val="accent2"/>
-          </a:effectRef>
-          <a:fontRef idx="minor">
-            <a:schemeClr val="dk1"/>
-          </a:fontRef>
-        </p:style>
-        <p:txBody>
-          <a:bodyPr rtlCol="0" anchor="ctr"/>
-          <a:lstStyle/>
-          <a:p>
-            <a:pPr algn="ctr"/>
-            <a:r>
-              <a:rPr lang="en-US" sz="1050" dirty="0" smtClean="0">
-                <a:solidFill>
-                  <a:schemeClr val="bg1"/>
-                </a:solidFill>
-              </a:rPr>
-              <a:t>&lt;&lt;interface&gt;&gt;</a:t>
-            </a:r>
-            <a:br>
-              <a:rPr lang="en-US" sz="1050" dirty="0" smtClean="0">
-                <a:solidFill>
-                  <a:schemeClr val="bg1"/>
-                </a:solidFill>
-              </a:rPr>
-            </a:br>
-            <a:r>
-              <a:rPr lang="en-US" sz="1050" dirty="0" err="1" smtClean="0">
-                <a:solidFill>
-                  <a:schemeClr val="bg1"/>
-                </a:solidFill>
-              </a:rPr>
-              <a:t>UserPrefsStorage</a:t>
-            </a:r>
-            <a:endParaRPr lang="en-SG" sz="1050" dirty="0">
-              <a:solidFill>
-                <a:schemeClr val="bg1"/>
-              </a:solidFill>
-            </a:endParaRPr>
-          </a:p>
-        </p:txBody>
-      </p:sp>
-      <p:cxnSp>
-        <p:nvCxnSpPr>
-          <p:cNvPr id="54" name="Straight Arrow Connector 53"/>
-          <p:cNvCxnSpPr>
-            <a:stCxn id="56" idx="3"/>
-            <a:endCxn id="52" idx="1"/>
-          </p:cNvCxnSpPr>
-          <p:nvPr/>
-        </p:nvCxnSpPr>
-        <p:spPr>
-          <a:xfrm>
-            <a:off x="2653133" y="2726136"/>
-            <a:ext cx="220810" cy="5284"/>
-          </a:xfrm>
-          <a:prstGeom prst="straightConnector1">
-            <a:avLst/>
-          </a:prstGeom>
-          <a:ln w="19050">
-            <a:solidFill>
-              <a:schemeClr val="accent6">
-                <a:lumMod val="75000"/>
-              </a:schemeClr>
-            </a:solidFill>
-            <a:headEnd type="none" w="med" len="med"/>
-            <a:tailEnd type="arrow" w="med" len="med"/>
-          </a:ln>
-          <a:effectLst/>
-        </p:spPr>
-        <p:style>
-          <a:lnRef idx="1">
-            <a:schemeClr val="accent2"/>
-          </a:lnRef>
-          <a:fillRef idx="2">
-            <a:schemeClr val="accent2"/>
-          </a:fillRef>
-          <a:effectRef idx="1">
-            <a:schemeClr val="accent2"/>
-          </a:effectRef>
-          <a:fontRef idx="minor">
-            <a:schemeClr val="dk1"/>
-          </a:fontRef>
-        </p:style>
-      </p:cxnSp>
-      <p:sp>
-        <p:nvSpPr>
-          <p:cNvPr id="56" name="Flowchart: Decision 96"/>
-          <p:cNvSpPr/>
-          <p:nvPr/>
-        </p:nvSpPr>
-        <p:spPr>
-          <a:xfrm>
-            <a:off x="2417085" y="2639446"/>
-            <a:ext cx="236048" cy="173380"/>
-          </a:xfrm>
-          <a:prstGeom prst="flowChartDecision">
-            <a:avLst/>
-          </a:prstGeom>
-          <a:noFill/>
-          <a:ln w="19050">
-            <a:solidFill>
-              <a:schemeClr val="accent6">
-                <a:lumMod val="75000"/>
-              </a:schemeClr>
-            </a:solidFill>
-          </a:ln>
-          <a:effectLst/>
-        </p:spPr>
-        <p:style>
-          <a:lnRef idx="1">
-            <a:schemeClr val="accent2"/>
-          </a:lnRef>
-          <a:fillRef idx="2">
-            <a:schemeClr val="accent2"/>
-          </a:fillRef>
-          <a:effectRef idx="1">
-            <a:schemeClr val="accent2"/>
-          </a:effectRef>
-          <a:fontRef idx="minor">
-            <a:schemeClr val="dk1"/>
-          </a:fontRef>
-        </p:style>
-        <p:txBody>
-          <a:bodyPr rtlCol="0" anchor="ctr"/>
-          <a:lstStyle/>
-          <a:p>
-            <a:pPr algn="ctr"/>
-            <a:endParaRPr lang="en-US" sz="1050">
-              <a:solidFill>
-                <a:schemeClr val="bg1"/>
-              </a:solidFill>
-            </a:endParaRPr>
-          </a:p>
-        </p:txBody>
-      </p:sp>
-      <p:cxnSp>
-        <p:nvCxnSpPr>
-          <p:cNvPr id="60" name="Elbow Connector 63"/>
-          <p:cNvCxnSpPr>
-            <a:stCxn id="61" idx="3"/>
-            <a:endCxn id="65" idx="1"/>
-          </p:cNvCxnSpPr>
-          <p:nvPr/>
-        </p:nvCxnSpPr>
-        <p:spPr>
-          <a:xfrm flipV="1">
-            <a:off x="4394804" y="2731420"/>
-            <a:ext cx="223324" cy="1"/>
-          </a:xfrm>
-          <a:prstGeom prst="bentConnector3">
-            <a:avLst>
-              <a:gd name="adj1" fmla="val 50000"/>
-            </a:avLst>
-          </a:prstGeom>
-          <a:ln w="19050">
-            <a:solidFill>
-              <a:schemeClr val="accent6">
-                <a:lumMod val="75000"/>
-              </a:schemeClr>
-            </a:solidFill>
-            <a:prstDash val="sysDot"/>
-            <a:headEnd type="none" w="med" len="med"/>
-            <a:tailEnd type="none" w="med" len="med"/>
-          </a:ln>
-          <a:effectLst/>
-        </p:spPr>
-        <p:style>
-          <a:lnRef idx="1">
-            <a:schemeClr val="accent2"/>
-          </a:lnRef>
-          <a:fillRef idx="2">
-            <a:schemeClr val="accent2"/>
-          </a:fillRef>
-          <a:effectRef idx="1">
-            <a:schemeClr val="accent2"/>
-          </a:effectRef>
-          <a:fontRef idx="minor">
-            <a:schemeClr val="dk1"/>
-          </a:fontRef>
-        </p:style>
-      </p:cxnSp>
-      <p:sp>
-        <p:nvSpPr>
-          <p:cNvPr id="61" name="Isosceles Triangle 102"/>
-          <p:cNvSpPr/>
-          <p:nvPr/>
-        </p:nvSpPr>
-        <p:spPr>
-          <a:xfrm rot="5400000" flipV="1">
-            <a:off x="4171790" y="2643659"/>
-            <a:ext cx="270504" cy="175523"/>
-          </a:xfrm>
-          <a:prstGeom prst="triangle">
-            <a:avLst/>
-          </a:prstGeom>
-          <a:solidFill>
-            <a:schemeClr val="accent6">
-              <a:lumMod val="75000"/>
-            </a:schemeClr>
-          </a:solidFill>
-          <a:ln w="19050">
-            <a:solidFill>
-              <a:schemeClr val="accent6">
-                <a:lumMod val="75000"/>
-              </a:schemeClr>
-            </a:solidFill>
-          </a:ln>
-          <a:effectLst/>
-        </p:spPr>
-        <p:style>
-          <a:lnRef idx="1">
-            <a:schemeClr val="accent2"/>
-          </a:lnRef>
-          <a:fillRef idx="2">
-            <a:schemeClr val="accent2"/>
-          </a:fillRef>
-          <a:effectRef idx="1">
-            <a:schemeClr val="accent2"/>
-          </a:effectRef>
-          <a:fontRef idx="minor">
-            <a:schemeClr val="dk1"/>
-          </a:fontRef>
-        </p:style>
-        <p:txBody>
-          <a:bodyPr rtlCol="0" anchor="ctr"/>
-          <a:lstStyle/>
-          <a:p>
-            <a:pPr algn="ctr"/>
-            <a:endParaRPr lang="en-SG" sz="1050">
-              <a:solidFill>
-                <a:schemeClr val="bg1"/>
-              </a:solidFill>
-            </a:endParaRPr>
-          </a:p>
-        </p:txBody>
-      </p:sp>
-      <p:sp>
-        <p:nvSpPr>
-          <p:cNvPr id="65" name="Rectangle 8"/>
-          <p:cNvSpPr/>
-          <p:nvPr/>
-        </p:nvSpPr>
-        <p:spPr>
-          <a:xfrm>
-            <a:off x="4618128" y="2558040"/>
-            <a:ext cx="1093635" cy="346760"/>
-          </a:xfrm>
-          <a:prstGeom prst="rect">
-            <a:avLst/>
-          </a:prstGeom>
-          <a:solidFill>
-            <a:schemeClr val="accent6">
-              <a:lumMod val="75000"/>
-            </a:schemeClr>
-          </a:solidFill>
-          <a:ln w="19050">
-            <a:solidFill>
-              <a:schemeClr val="accent6">
-                <a:lumMod val="75000"/>
-              </a:schemeClr>
-            </a:solidFill>
-          </a:ln>
-          <a:effectLst/>
-        </p:spPr>
-        <p:style>
-          <a:lnRef idx="1">
-            <a:schemeClr val="accent2"/>
-          </a:lnRef>
-          <a:fillRef idx="2">
-            <a:schemeClr val="accent2"/>
-          </a:fillRef>
-          <a:effectRef idx="1">
-            <a:schemeClr val="accent2"/>
-          </a:effectRef>
-          <a:fontRef idx="minor">
-            <a:schemeClr val="dk1"/>
-          </a:fontRef>
-        </p:style>
-        <p:txBody>
-          <a:bodyPr rtlCol="0" anchor="ctr"/>
-          <a:lstStyle/>
-          <a:p>
-            <a:pPr algn="ctr"/>
-            <a:r>
-              <a:rPr lang="en-US" sz="1050" dirty="0" err="1" smtClean="0">
-                <a:solidFill>
-                  <a:schemeClr val="bg1"/>
-                </a:solidFill>
-              </a:rPr>
-              <a:t>JsonUserPrefs</a:t>
-            </a:r>
-            <a:r>
-              <a:rPr lang="en-US" sz="1050" dirty="0" smtClean="0">
-                <a:solidFill>
-                  <a:schemeClr val="bg1"/>
-                </a:solidFill>
-              </a:rPr>
-              <a:t/>
-            </a:r>
-            <a:br>
-              <a:rPr lang="en-US" sz="1050" dirty="0" smtClean="0">
-                <a:solidFill>
-                  <a:schemeClr val="bg1"/>
-                </a:solidFill>
-              </a:rPr>
-            </a:br>
-            <a:r>
-              <a:rPr lang="en-US" sz="1050" dirty="0" smtClean="0">
-                <a:solidFill>
-                  <a:schemeClr val="bg1"/>
-                </a:solidFill>
-              </a:rPr>
-              <a:t>Storage</a:t>
-            </a:r>
-            <a:endParaRPr lang="en-SG" sz="1050" dirty="0">
-              <a:solidFill>
-                <a:schemeClr val="bg1"/>
-              </a:solidFill>
-            </a:endParaRPr>
-          </a:p>
-        </p:txBody>
-      </p:sp>
-      <p:sp>
-        <p:nvSpPr>
-          <p:cNvPr id="66" name="Rectangle 8"/>
-          <p:cNvSpPr/>
-          <p:nvPr/>
-        </p:nvSpPr>
-        <p:spPr>
-          <a:xfrm>
-            <a:off x="6019800" y="3160410"/>
-            <a:ext cx="1200707" cy="346760"/>
-          </a:xfrm>
-          <a:prstGeom prst="rect">
-            <a:avLst/>
-          </a:prstGeom>
-          <a:ln w="19050"/>
-          <a:effectLst/>
-        </p:spPr>
-        <p:style>
-          <a:lnRef idx="1">
-            <a:schemeClr val="accent6"/>
-          </a:lnRef>
-          <a:fillRef idx="2">
-            <a:schemeClr val="accent6"/>
-          </a:fillRef>
-          <a:effectRef idx="1">
-            <a:schemeClr val="accent6"/>
-          </a:effectRef>
-          <a:fontRef idx="minor">
-            <a:schemeClr val="dk1"/>
-          </a:fontRef>
-        </p:style>
-        <p:txBody>
-          <a:bodyPr rtlCol="0" anchor="ctr"/>
-          <a:lstStyle/>
-          <a:p>
-            <a:pPr algn="ctr"/>
-            <a:r>
               <a:rPr lang="en-US" sz="1050" b="1" dirty="0" err="1" smtClean="0">
                 <a:solidFill>
                   <a:schemeClr val="accent6">
@@ -16574,36 +16319,7 @@
                   </a:schemeClr>
                 </a:solidFill>
               </a:rPr>
-              <a:t>XmlSerializable</a:t>
-            </a:r>
-            <a:r>
-              <a:rPr lang="en-US" sz="1050" b="1" dirty="0" smtClean="0">
-                <a:solidFill>
-                  <a:schemeClr val="accent6">
-                    <a:lumMod val="75000"/>
-                  </a:schemeClr>
-                </a:solidFill>
-              </a:rPr>
-              <a:t/>
-            </a:r>
-            <a:br>
-              <a:rPr lang="en-US" sz="1050" b="1" dirty="0" smtClean="0">
-                <a:solidFill>
-                  <a:schemeClr val="accent6">
-                    <a:lumMod val="75000"/>
-                  </a:schemeClr>
-                </a:solidFill>
-              </a:rPr>
-            </a:br>
-            <a:r>
-              <a:rPr lang="en-US" sz="1050" b="1" dirty="0" err="1" smtClean="0">
-                <a:solidFill>
-                  <a:schemeClr val="accent6">
-                    <a:lumMod val="75000"/>
-                  </a:schemeClr>
-                </a:solidFill>
-              </a:rPr>
-              <a:t>AddressBook</a:t>
+              <a:t>ToDoList</a:t>
             </a:r>
             <a:endParaRPr lang="en-SG" sz="1050" b="1" dirty="0">
               <a:solidFill>
@@ -16756,7 +16472,7 @@
                   </a:schemeClr>
                 </a:solidFill>
               </a:rPr>
-              <a:t>XmlAdaptedPerson</a:t>
+              <a:t>XmlAdaptedTask</a:t>
             </a:r>
             <a:endParaRPr lang="en-SG" sz="1050" b="1" dirty="0">
               <a:solidFill>

</xml_diff>

<commit_message>
Update storage class diagrams in .ppt and .png
</commit_message>
<xml_diff>
--- a/docs/diagrams/Diagrams.pptx
+++ b/docs/diagrams/Diagrams.pptx
@@ -117,7 +117,7 @@
   </p:defaultTextStyle>
   <p:extLst>
     <p:ext uri="{EFAFB233-063F-42B5-8137-9DF3F51BA10A}">
-      <p15:sldGuideLst xmlns:p15="http://schemas.microsoft.com/office/powerpoint/2012/main">
+      <p15:sldGuideLst xmlns:p15="http://schemas.microsoft.com/office/powerpoint/2012/main" xmlns="">
         <p15:guide id="1" orient="horz" pos="1488">
           <p15:clr>
             <a:srgbClr val="A4A3A4"/>
@@ -216,7 +216,7 @@
           <a:p>
             <a:fld id="{F5CC4B3F-88C1-4FFA-B1B6-F41C21DC6924}" type="datetimeFigureOut">
               <a:rPr lang="en-US" smtClean="0"/>
-              <a:t>10/14/16</a:t>
+              <a:t>10/15/2016</a:t>
             </a:fld>
             <a:endParaRPr lang="en-US"/>
           </a:p>
@@ -665,7 +665,7 @@
           <a:p>
             <a:fld id="{78C97017-6FC3-485B-9764-EAC9E56C1D49}" type="datetimeFigureOut">
               <a:rPr lang="en-US" smtClean="0"/>
-              <a:t>10/14/16</a:t>
+              <a:t>10/15/2016</a:t>
             </a:fld>
             <a:endParaRPr lang="en-US"/>
           </a:p>
@@ -835,7 +835,7 @@
           <a:p>
             <a:fld id="{78C97017-6FC3-485B-9764-EAC9E56C1D49}" type="datetimeFigureOut">
               <a:rPr lang="en-US" smtClean="0"/>
-              <a:t>10/14/16</a:t>
+              <a:t>10/15/2016</a:t>
             </a:fld>
             <a:endParaRPr lang="en-US"/>
           </a:p>
@@ -1015,7 +1015,7 @@
           <a:p>
             <a:fld id="{78C97017-6FC3-485B-9764-EAC9E56C1D49}" type="datetimeFigureOut">
               <a:rPr lang="en-US" smtClean="0"/>
-              <a:t>10/14/16</a:t>
+              <a:t>10/15/2016</a:t>
             </a:fld>
             <a:endParaRPr lang="en-US"/>
           </a:p>
@@ -1185,7 +1185,7 @@
           <a:p>
             <a:fld id="{78C97017-6FC3-485B-9764-EAC9E56C1D49}" type="datetimeFigureOut">
               <a:rPr lang="en-US" smtClean="0"/>
-              <a:t>10/14/16</a:t>
+              <a:t>10/15/2016</a:t>
             </a:fld>
             <a:endParaRPr lang="en-US"/>
           </a:p>
@@ -1431,7 +1431,7 @@
           <a:p>
             <a:fld id="{78C97017-6FC3-485B-9764-EAC9E56C1D49}" type="datetimeFigureOut">
               <a:rPr lang="en-US" smtClean="0"/>
-              <a:t>10/14/16</a:t>
+              <a:t>10/15/2016</a:t>
             </a:fld>
             <a:endParaRPr lang="en-US"/>
           </a:p>
@@ -1719,7 +1719,7 @@
           <a:p>
             <a:fld id="{78C97017-6FC3-485B-9764-EAC9E56C1D49}" type="datetimeFigureOut">
               <a:rPr lang="en-US" smtClean="0"/>
-              <a:t>10/14/16</a:t>
+              <a:t>10/15/2016</a:t>
             </a:fld>
             <a:endParaRPr lang="en-US"/>
           </a:p>
@@ -2141,7 +2141,7 @@
           <a:p>
             <a:fld id="{78C97017-6FC3-485B-9764-EAC9E56C1D49}" type="datetimeFigureOut">
               <a:rPr lang="en-US" smtClean="0"/>
-              <a:t>10/14/16</a:t>
+              <a:t>10/15/2016</a:t>
             </a:fld>
             <a:endParaRPr lang="en-US"/>
           </a:p>
@@ -2259,7 +2259,7 @@
           <a:p>
             <a:fld id="{78C97017-6FC3-485B-9764-EAC9E56C1D49}" type="datetimeFigureOut">
               <a:rPr lang="en-US" smtClean="0"/>
-              <a:t>10/14/16</a:t>
+              <a:t>10/15/2016</a:t>
             </a:fld>
             <a:endParaRPr lang="en-US"/>
           </a:p>
@@ -2354,7 +2354,7 @@
           <a:p>
             <a:fld id="{78C97017-6FC3-485B-9764-EAC9E56C1D49}" type="datetimeFigureOut">
               <a:rPr lang="en-US" smtClean="0"/>
-              <a:t>10/14/16</a:t>
+              <a:t>10/15/2016</a:t>
             </a:fld>
             <a:endParaRPr lang="en-US"/>
           </a:p>
@@ -2631,7 +2631,7 @@
           <a:p>
             <a:fld id="{78C97017-6FC3-485B-9764-EAC9E56C1D49}" type="datetimeFigureOut">
               <a:rPr lang="en-US" smtClean="0"/>
-              <a:t>10/14/16</a:t>
+              <a:t>10/15/2016</a:t>
             </a:fld>
             <a:endParaRPr lang="en-US"/>
           </a:p>
@@ -2884,7 +2884,7 @@
           <a:p>
             <a:fld id="{78C97017-6FC3-485B-9764-EAC9E56C1D49}" type="datetimeFigureOut">
               <a:rPr lang="en-US" smtClean="0"/>
-              <a:t>10/14/16</a:t>
+              <a:t>10/15/2016</a:t>
             </a:fld>
             <a:endParaRPr lang="en-US"/>
           </a:p>
@@ -3097,7 +3097,7 @@
           <a:p>
             <a:fld id="{78C97017-6FC3-485B-9764-EAC9E56C1D49}" type="datetimeFigureOut">
               <a:rPr lang="en-US" smtClean="0"/>
-              <a:t>10/14/16</a:t>
+              <a:t>10/15/2016</a:t>
             </a:fld>
             <a:endParaRPr lang="en-US"/>
           </a:p>
@@ -16320,103 +16320,6 @@
                 </a:solidFill>
               </a:rPr>
               <a:t>ToDoList</a:t>
-            </a:r>
-            <a:endParaRPr lang="en-SG" sz="1050" b="1" dirty="0">
-              <a:solidFill>
-                <a:schemeClr val="accent6">
-                  <a:lumMod val="75000"/>
-                </a:schemeClr>
-              </a:solidFill>
-            </a:endParaRPr>
-          </a:p>
-        </p:txBody>
-      </p:sp>
-      <p:cxnSp>
-        <p:nvCxnSpPr>
-          <p:cNvPr id="70" name="Elbow Connector 122"/>
-          <p:cNvCxnSpPr>
-            <a:stCxn id="74" idx="0"/>
-            <a:endCxn id="73" idx="2"/>
-          </p:cNvCxnSpPr>
-          <p:nvPr/>
-        </p:nvCxnSpPr>
-        <p:spPr>
-          <a:xfrm rot="5400000" flipH="1" flipV="1">
-            <a:off x="8077993" y="2992020"/>
-            <a:ext cx="335208" cy="12700"/>
-          </a:xfrm>
-          <a:prstGeom prst="bentConnector3">
-            <a:avLst>
-              <a:gd name="adj1" fmla="val 50000"/>
-            </a:avLst>
-          </a:prstGeom>
-          <a:ln w="19050">
-            <a:prstDash val="sysDot"/>
-            <a:headEnd type="none" w="med" len="med"/>
-            <a:tailEnd type="arrow" w="med" len="med"/>
-          </a:ln>
-          <a:effectLst/>
-        </p:spPr>
-        <p:style>
-          <a:lnRef idx="1">
-            <a:schemeClr val="accent6"/>
-          </a:lnRef>
-          <a:fillRef idx="2">
-            <a:schemeClr val="accent6"/>
-          </a:fillRef>
-          <a:effectRef idx="1">
-            <a:schemeClr val="accent6"/>
-          </a:effectRef>
-          <a:fontRef idx="minor">
-            <a:schemeClr val="dk1"/>
-          </a:fontRef>
-        </p:style>
-      </p:cxnSp>
-      <p:sp>
-        <p:nvSpPr>
-          <p:cNvPr id="73" name="Rectangle 8"/>
-          <p:cNvSpPr/>
-          <p:nvPr/>
-        </p:nvSpPr>
-        <p:spPr>
-          <a:xfrm>
-            <a:off x="7615738" y="2477656"/>
-            <a:ext cx="1259718" cy="346760"/>
-          </a:xfrm>
-          <a:prstGeom prst="rect">
-            <a:avLst/>
-          </a:prstGeom>
-          <a:ln w="19050"/>
-          <a:effectLst/>
-        </p:spPr>
-        <p:style>
-          <a:lnRef idx="1">
-            <a:schemeClr val="accent6"/>
-          </a:lnRef>
-          <a:fillRef idx="2">
-            <a:schemeClr val="accent6"/>
-          </a:fillRef>
-          <a:effectRef idx="1">
-            <a:schemeClr val="accent6"/>
-          </a:effectRef>
-          <a:fontRef idx="minor">
-            <a:schemeClr val="dk1"/>
-          </a:fontRef>
-        </p:style>
-        <p:txBody>
-          <a:bodyPr rtlCol="0" anchor="ctr"/>
-          <a:lstStyle/>
-          <a:p>
-            <a:pPr algn="ctr"/>
-            <a:r>
-              <a:rPr lang="en-US" sz="1050" b="1" dirty="0" err="1" smtClean="0">
-                <a:solidFill>
-                  <a:schemeClr val="accent6">
-                    <a:lumMod val="75000"/>
-                  </a:schemeClr>
-                </a:solidFill>
-              </a:rPr>
-              <a:t>XmlAdaptedTag</a:t>
             </a:r>
             <a:endParaRPr lang="en-SG" sz="1050" b="1" dirty="0">
               <a:solidFill>

</xml_diff>

<commit_message>
Add Storage manager object diagram
</commit_message>
<xml_diff>
--- a/docs/diagrams/Diagrams.pptx
+++ b/docs/diagrams/Diagrams.pptx
@@ -5,7 +5,7 @@
     <p:sldMasterId id="2147483648" r:id="rId1"/>
   </p:sldMasterIdLst>
   <p:notesMasterIdLst>
-    <p:notesMasterId r:id="rId11"/>
+    <p:notesMasterId r:id="rId12"/>
   </p:notesMasterIdLst>
   <p:sldIdLst>
     <p:sldId id="256" r:id="rId2"/>
@@ -17,6 +17,7 @@
     <p:sldId id="263" r:id="rId8"/>
     <p:sldId id="264" r:id="rId9"/>
     <p:sldId id="265" r:id="rId10"/>
+    <p:sldId id="268" r:id="rId11"/>
   </p:sldIdLst>
   <p:sldSz cx="9144000" cy="6858000" type="screen4x3"/>
   <p:notesSz cx="6858000" cy="9144000"/>
@@ -117,7 +118,7 @@
   </p:defaultTextStyle>
   <p:extLst>
     <p:ext uri="{EFAFB233-063F-42B5-8137-9DF3F51BA10A}">
-      <p15:sldGuideLst xmlns:p15="http://schemas.microsoft.com/office/powerpoint/2012/main" xmlns="">
+      <p15:sldGuideLst xmlns="" xmlns:p15="http://schemas.microsoft.com/office/powerpoint/2012/main">
         <p15:guide id="1" orient="horz" pos="1488">
           <p15:clr>
             <a:srgbClr val="A4A3A4"/>
@@ -216,7 +217,7 @@
           <a:p>
             <a:fld id="{F5CC4B3F-88C1-4FFA-B1B6-F41C21DC6924}" type="datetimeFigureOut">
               <a:rPr lang="en-US" smtClean="0"/>
-              <a:t>10/15/2016</a:t>
+              <a:t>10/22/2016</a:t>
             </a:fld>
             <a:endParaRPr lang="en-US"/>
           </a:p>
@@ -665,7 +666,7 @@
           <a:p>
             <a:fld id="{78C97017-6FC3-485B-9764-EAC9E56C1D49}" type="datetimeFigureOut">
               <a:rPr lang="en-US" smtClean="0"/>
-              <a:t>10/15/2016</a:t>
+              <a:t>10/22/2016</a:t>
             </a:fld>
             <a:endParaRPr lang="en-US"/>
           </a:p>
@@ -835,7 +836,7 @@
           <a:p>
             <a:fld id="{78C97017-6FC3-485B-9764-EAC9E56C1D49}" type="datetimeFigureOut">
               <a:rPr lang="en-US" smtClean="0"/>
-              <a:t>10/15/2016</a:t>
+              <a:t>10/22/2016</a:t>
             </a:fld>
             <a:endParaRPr lang="en-US"/>
           </a:p>
@@ -1015,7 +1016,7 @@
           <a:p>
             <a:fld id="{78C97017-6FC3-485B-9764-EAC9E56C1D49}" type="datetimeFigureOut">
               <a:rPr lang="en-US" smtClean="0"/>
-              <a:t>10/15/2016</a:t>
+              <a:t>10/22/2016</a:t>
             </a:fld>
             <a:endParaRPr lang="en-US"/>
           </a:p>
@@ -1185,7 +1186,7 @@
           <a:p>
             <a:fld id="{78C97017-6FC3-485B-9764-EAC9E56C1D49}" type="datetimeFigureOut">
               <a:rPr lang="en-US" smtClean="0"/>
-              <a:t>10/15/2016</a:t>
+              <a:t>10/22/2016</a:t>
             </a:fld>
             <a:endParaRPr lang="en-US"/>
           </a:p>
@@ -1431,7 +1432,7 @@
           <a:p>
             <a:fld id="{78C97017-6FC3-485B-9764-EAC9E56C1D49}" type="datetimeFigureOut">
               <a:rPr lang="en-US" smtClean="0"/>
-              <a:t>10/15/2016</a:t>
+              <a:t>10/22/2016</a:t>
             </a:fld>
             <a:endParaRPr lang="en-US"/>
           </a:p>
@@ -1719,7 +1720,7 @@
           <a:p>
             <a:fld id="{78C97017-6FC3-485B-9764-EAC9E56C1D49}" type="datetimeFigureOut">
               <a:rPr lang="en-US" smtClean="0"/>
-              <a:t>10/15/2016</a:t>
+              <a:t>10/22/2016</a:t>
             </a:fld>
             <a:endParaRPr lang="en-US"/>
           </a:p>
@@ -2141,7 +2142,7 @@
           <a:p>
             <a:fld id="{78C97017-6FC3-485B-9764-EAC9E56C1D49}" type="datetimeFigureOut">
               <a:rPr lang="en-US" smtClean="0"/>
-              <a:t>10/15/2016</a:t>
+              <a:t>10/22/2016</a:t>
             </a:fld>
             <a:endParaRPr lang="en-US"/>
           </a:p>
@@ -2259,7 +2260,7 @@
           <a:p>
             <a:fld id="{78C97017-6FC3-485B-9764-EAC9E56C1D49}" type="datetimeFigureOut">
               <a:rPr lang="en-US" smtClean="0"/>
-              <a:t>10/15/2016</a:t>
+              <a:t>10/22/2016</a:t>
             </a:fld>
             <a:endParaRPr lang="en-US"/>
           </a:p>
@@ -2354,7 +2355,7 @@
           <a:p>
             <a:fld id="{78C97017-6FC3-485B-9764-EAC9E56C1D49}" type="datetimeFigureOut">
               <a:rPr lang="en-US" smtClean="0"/>
-              <a:t>10/15/2016</a:t>
+              <a:t>10/22/2016</a:t>
             </a:fld>
             <a:endParaRPr lang="en-US"/>
           </a:p>
@@ -2631,7 +2632,7 @@
           <a:p>
             <a:fld id="{78C97017-6FC3-485B-9764-EAC9E56C1D49}" type="datetimeFigureOut">
               <a:rPr lang="en-US" smtClean="0"/>
-              <a:t>10/15/2016</a:t>
+              <a:t>10/22/2016</a:t>
             </a:fld>
             <a:endParaRPr lang="en-US"/>
           </a:p>
@@ -2884,7 +2885,7 @@
           <a:p>
             <a:fld id="{78C97017-6FC3-485B-9764-EAC9E56C1D49}" type="datetimeFigureOut">
               <a:rPr lang="en-US" smtClean="0"/>
-              <a:t>10/15/2016</a:t>
+              <a:t>10/22/2016</a:t>
             </a:fld>
             <a:endParaRPr lang="en-US"/>
           </a:p>
@@ -3097,7 +3098,7 @@
           <a:p>
             <a:fld id="{78C97017-6FC3-485B-9764-EAC9E56C1D49}" type="datetimeFigureOut">
               <a:rPr lang="en-US" smtClean="0"/>
-              <a:t>10/15/2016</a:t>
+              <a:t>10/22/2016</a:t>
             </a:fld>
             <a:endParaRPr lang="en-US"/>
           </a:p>
@@ -3535,6 +3536,36 @@
 </p:sld>
 </file>
 
+<file path=ppt/slides/slide10.xml><?xml version="1.0" encoding="utf-8"?>
+<p:sld xmlns:a="http://schemas.openxmlformats.org/drawingml/2006/main" xmlns:r="http://schemas.openxmlformats.org/officeDocument/2006/relationships" xmlns:p="http://schemas.openxmlformats.org/presentationml/2006/main">
+  <p:cSld>
+    <p:spTree>
+      <p:nvGrpSpPr>
+        <p:cNvPr id="1" name=""/>
+        <p:cNvGrpSpPr/>
+        <p:nvPr/>
+      </p:nvGrpSpPr>
+      <p:grpSpPr>
+        <a:xfrm>
+          <a:off x="0" y="0"/>
+          <a:ext cx="0" cy="0"/>
+          <a:chOff x="0" y="0"/>
+          <a:chExt cx="0" cy="0"/>
+        </a:xfrm>
+      </p:grpSpPr>
+    </p:spTree>
+    <p:extLst>
+      <p:ext uri="{BB962C8B-B14F-4D97-AF65-F5344CB8AC3E}">
+        <p14:creationId xmlns:p14="http://schemas.microsoft.com/office/powerpoint/2010/main" val="2018796629"/>
+      </p:ext>
+    </p:extLst>
+  </p:cSld>
+  <p:clrMapOvr>
+    <a:masterClrMapping/>
+  </p:clrMapOvr>
+</p:sld>
+</file>
+
 <file path=ppt/slides/slide2.xml><?xml version="1.0" encoding="utf-8"?>
 <p:sld xmlns:a="http://schemas.openxmlformats.org/drawingml/2006/main" xmlns:r="http://schemas.openxmlformats.org/officeDocument/2006/relationships" xmlns:p="http://schemas.openxmlformats.org/presentationml/2006/main">
   <p:cSld>
@@ -16465,6 +16496,553 @@
           <a:chExt cx="0" cy="0"/>
         </a:xfrm>
       </p:grpSpPr>
+      <p:grpSp>
+        <p:nvGrpSpPr>
+          <p:cNvPr id="57" name="Group 56"/>
+          <p:cNvGrpSpPr/>
+          <p:nvPr/>
+        </p:nvGrpSpPr>
+        <p:grpSpPr>
+          <a:xfrm>
+            <a:off x="2286000" y="1853540"/>
+            <a:ext cx="4644908" cy="2390743"/>
+            <a:chOff x="2419161" y="1981200"/>
+            <a:chExt cx="4644908" cy="2390743"/>
+          </a:xfrm>
+        </p:grpSpPr>
+        <p:sp>
+          <p:nvSpPr>
+            <p:cNvPr id="4" name="Rectangle 62"/>
+            <p:cNvSpPr/>
+            <p:nvPr/>
+          </p:nvSpPr>
+          <p:spPr>
+            <a:xfrm>
+              <a:off x="4003446" y="2819400"/>
+              <a:ext cx="1362038" cy="346760"/>
+            </a:xfrm>
+            <a:prstGeom prst="rect">
+              <a:avLst/>
+            </a:prstGeom>
+            <a:solidFill>
+              <a:schemeClr val="accent6">
+                <a:lumMod val="75000"/>
+              </a:schemeClr>
+            </a:solidFill>
+            <a:ln w="19050">
+              <a:solidFill>
+                <a:schemeClr val="accent6">
+                  <a:lumMod val="75000"/>
+                </a:schemeClr>
+              </a:solidFill>
+            </a:ln>
+            <a:effectLst/>
+          </p:spPr>
+          <p:style>
+            <a:lnRef idx="1">
+              <a:schemeClr val="accent2"/>
+            </a:lnRef>
+            <a:fillRef idx="2">
+              <a:schemeClr val="accent2"/>
+            </a:fillRef>
+            <a:effectRef idx="1">
+              <a:schemeClr val="accent2"/>
+            </a:effectRef>
+            <a:fontRef idx="minor">
+              <a:schemeClr val="dk1"/>
+            </a:fontRef>
+          </p:style>
+          <p:txBody>
+            <a:bodyPr rtlCol="0" anchor="ctr"/>
+            <a:lstStyle/>
+            <a:p>
+              <a:pPr algn="ctr"/>
+              <a:r>
+                <a:rPr lang="en-US" sz="1200" dirty="0" smtClean="0">
+                  <a:solidFill>
+                    <a:schemeClr val="bg1"/>
+                  </a:solidFill>
+                </a:rPr>
+                <a:t>: </a:t>
+              </a:r>
+              <a:r>
+                <a:rPr lang="en-US" sz="1200" dirty="0" err="1" smtClean="0">
+                  <a:solidFill>
+                    <a:schemeClr val="bg1"/>
+                  </a:solidFill>
+                </a:rPr>
+                <a:t>StorageManager</a:t>
+              </a:r>
+              <a:endParaRPr lang="en-SG" sz="1200" dirty="0">
+                <a:solidFill>
+                  <a:schemeClr val="bg1"/>
+                </a:solidFill>
+              </a:endParaRPr>
+            </a:p>
+          </p:txBody>
+        </p:sp>
+        <p:sp>
+          <p:nvSpPr>
+            <p:cNvPr id="13" name="Rectangle 8"/>
+            <p:cNvSpPr/>
+            <p:nvPr/>
+          </p:nvSpPr>
+          <p:spPr>
+            <a:xfrm>
+              <a:off x="5894234" y="4017562"/>
+              <a:ext cx="1169835" cy="346760"/>
+            </a:xfrm>
+            <a:prstGeom prst="rect">
+              <a:avLst/>
+            </a:prstGeom>
+            <a:ln/>
+          </p:spPr>
+          <p:style>
+            <a:lnRef idx="2">
+              <a:schemeClr val="accent6"/>
+            </a:lnRef>
+            <a:fillRef idx="1">
+              <a:schemeClr val="lt1"/>
+            </a:fillRef>
+            <a:effectRef idx="0">
+              <a:schemeClr val="accent6"/>
+            </a:effectRef>
+            <a:fontRef idx="minor">
+              <a:schemeClr val="dk1"/>
+            </a:fontRef>
+          </p:style>
+          <p:txBody>
+            <a:bodyPr rtlCol="0" anchor="ctr"/>
+            <a:lstStyle/>
+            <a:p>
+              <a:pPr algn="ctr"/>
+              <a:r>
+                <a:rPr lang="en-US" sz="1050" b="1" dirty="0" smtClean="0">
+                  <a:solidFill>
+                    <a:schemeClr val="accent6">
+                      <a:lumMod val="75000"/>
+                    </a:schemeClr>
+                  </a:solidFill>
+                </a:rPr>
+                <a:t>: </a:t>
+              </a:r>
+              <a:r>
+                <a:rPr lang="en-US" sz="1050" b="1" dirty="0" err="1" smtClean="0">
+                  <a:solidFill>
+                    <a:schemeClr val="accent6">
+                      <a:lumMod val="75000"/>
+                    </a:schemeClr>
+                  </a:solidFill>
+                </a:rPr>
+                <a:t>XmlToDoList</a:t>
+              </a:r>
+              <a:endParaRPr lang="en-US" sz="1050" b="1" dirty="0" smtClean="0">
+                <a:solidFill>
+                  <a:schemeClr val="accent6">
+                    <a:lumMod val="75000"/>
+                  </a:schemeClr>
+                </a:solidFill>
+              </a:endParaRPr>
+            </a:p>
+            <a:p>
+              <a:pPr algn="ctr"/>
+              <a:r>
+                <a:rPr lang="en-US" sz="1050" b="1" dirty="0" smtClean="0">
+                  <a:solidFill>
+                    <a:schemeClr val="accent6">
+                      <a:lumMod val="75000"/>
+                    </a:schemeClr>
+                  </a:solidFill>
+                </a:rPr>
+                <a:t>Storage</a:t>
+              </a:r>
+              <a:endParaRPr lang="en-SG" sz="1050" b="1" dirty="0">
+                <a:solidFill>
+                  <a:schemeClr val="accent6">
+                    <a:lumMod val="75000"/>
+                  </a:schemeClr>
+                </a:solidFill>
+              </a:endParaRPr>
+            </a:p>
+          </p:txBody>
+        </p:sp>
+        <p:sp>
+          <p:nvSpPr>
+            <p:cNvPr id="19" name="Rectangle 8"/>
+            <p:cNvSpPr/>
+            <p:nvPr/>
+          </p:nvSpPr>
+          <p:spPr>
+            <a:xfrm>
+              <a:off x="2419161" y="4025183"/>
+              <a:ext cx="1093635" cy="346760"/>
+            </a:xfrm>
+            <a:prstGeom prst="rect">
+              <a:avLst/>
+            </a:prstGeom>
+            <a:ln/>
+          </p:spPr>
+          <p:style>
+            <a:lnRef idx="2">
+              <a:schemeClr val="accent6"/>
+            </a:lnRef>
+            <a:fillRef idx="1">
+              <a:schemeClr val="lt1"/>
+            </a:fillRef>
+            <a:effectRef idx="0">
+              <a:schemeClr val="accent6"/>
+            </a:effectRef>
+            <a:fontRef idx="minor">
+              <a:schemeClr val="dk1"/>
+            </a:fontRef>
+          </p:style>
+          <p:txBody>
+            <a:bodyPr rtlCol="0" anchor="ctr"/>
+            <a:lstStyle/>
+            <a:p>
+              <a:pPr algn="ctr"/>
+              <a:r>
+                <a:rPr lang="en-US" sz="1050" b="1" dirty="0" smtClean="0">
+                  <a:solidFill>
+                    <a:schemeClr val="accent6">
+                      <a:lumMod val="75000"/>
+                    </a:schemeClr>
+                  </a:solidFill>
+                </a:rPr>
+                <a:t>: </a:t>
+              </a:r>
+              <a:r>
+                <a:rPr lang="en-US" sz="1050" b="1" dirty="0" err="1" smtClean="0">
+                  <a:solidFill>
+                    <a:schemeClr val="accent6">
+                      <a:lumMod val="75000"/>
+                    </a:schemeClr>
+                  </a:solidFill>
+                </a:rPr>
+                <a:t>JsonUserPrefs</a:t>
+              </a:r>
+              <a:r>
+                <a:rPr lang="en-US" sz="1050" b="1" dirty="0" smtClean="0">
+                  <a:solidFill>
+                    <a:schemeClr val="accent6">
+                      <a:lumMod val="75000"/>
+                    </a:schemeClr>
+                  </a:solidFill>
+                </a:rPr>
+                <a:t/>
+              </a:r>
+              <a:br>
+                <a:rPr lang="en-US" sz="1050" b="1" dirty="0" smtClean="0">
+                  <a:solidFill>
+                    <a:schemeClr val="accent6">
+                      <a:lumMod val="75000"/>
+                    </a:schemeClr>
+                  </a:solidFill>
+                </a:rPr>
+              </a:br>
+              <a:r>
+                <a:rPr lang="en-US" sz="1050" b="1" dirty="0" smtClean="0">
+                  <a:solidFill>
+                    <a:schemeClr val="accent6">
+                      <a:lumMod val="75000"/>
+                    </a:schemeClr>
+                  </a:solidFill>
+                </a:rPr>
+                <a:t>Storage</a:t>
+              </a:r>
+              <a:endParaRPr lang="en-SG" sz="1050" b="1" dirty="0">
+                <a:solidFill>
+                  <a:schemeClr val="accent6">
+                    <a:lumMod val="75000"/>
+                  </a:schemeClr>
+                </a:solidFill>
+              </a:endParaRPr>
+            </a:p>
+          </p:txBody>
+        </p:sp>
+        <p:sp>
+          <p:nvSpPr>
+            <p:cNvPr id="23" name="Rounded Rectangle 22"/>
+            <p:cNvSpPr/>
+            <p:nvPr/>
+          </p:nvSpPr>
+          <p:spPr>
+            <a:xfrm>
+              <a:off x="4003446" y="1981200"/>
+              <a:ext cx="1362038" cy="367582"/>
+            </a:xfrm>
+            <a:prstGeom prst="roundRect">
+              <a:avLst>
+                <a:gd name="adj" fmla="val 5768"/>
+              </a:avLst>
+            </a:prstGeom>
+            <a:solidFill>
+              <a:schemeClr val="bg1">
+                <a:lumMod val="95000"/>
+              </a:schemeClr>
+            </a:solidFill>
+            <a:ln>
+              <a:solidFill>
+                <a:schemeClr val="bg1">
+                  <a:lumMod val="85000"/>
+                </a:schemeClr>
+              </a:solidFill>
+            </a:ln>
+          </p:spPr>
+          <p:style>
+            <a:lnRef idx="2">
+              <a:schemeClr val="accent1">
+                <a:shade val="50000"/>
+              </a:schemeClr>
+            </a:lnRef>
+            <a:fillRef idx="1">
+              <a:schemeClr val="accent1"/>
+            </a:fillRef>
+            <a:effectRef idx="0">
+              <a:schemeClr val="accent1"/>
+            </a:effectRef>
+            <a:fontRef idx="minor">
+              <a:schemeClr val="lt1"/>
+            </a:fontRef>
+          </p:style>
+          <p:txBody>
+            <a:bodyPr rtlCol="0" anchor="ctr"/>
+            <a:lstStyle/>
+            <a:p>
+              <a:pPr algn="ctr"/>
+              <a:r>
+                <a:rPr lang="en-US" sz="1400" dirty="0" smtClean="0">
+                  <a:solidFill>
+                    <a:schemeClr val="tx1"/>
+                  </a:solidFill>
+                </a:rPr>
+                <a:t>: </a:t>
+              </a:r>
+              <a:r>
+                <a:rPr lang="en-US" sz="1400" dirty="0" err="1" smtClean="0">
+                  <a:solidFill>
+                    <a:schemeClr val="tx1"/>
+                  </a:solidFill>
+                </a:rPr>
+                <a:t>MainApp</a:t>
+              </a:r>
+              <a:endParaRPr lang="en-US" sz="1400" dirty="0">
+                <a:solidFill>
+                  <a:schemeClr val="tx1"/>
+                </a:solidFill>
+              </a:endParaRPr>
+            </a:p>
+          </p:txBody>
+        </p:sp>
+        <p:cxnSp>
+          <p:nvCxnSpPr>
+            <p:cNvPr id="30" name="Straight Connector 29"/>
+            <p:cNvCxnSpPr>
+              <a:stCxn id="23" idx="2"/>
+              <a:endCxn id="4" idx="0"/>
+            </p:cNvCxnSpPr>
+            <p:nvPr/>
+          </p:nvCxnSpPr>
+          <p:spPr>
+            <a:xfrm>
+              <a:off x="4684465" y="2348782"/>
+              <a:ext cx="0" cy="470618"/>
+            </a:xfrm>
+            <a:prstGeom prst="line">
+              <a:avLst/>
+            </a:prstGeom>
+            <a:ln w="28575">
+              <a:solidFill>
+                <a:schemeClr val="tx1"/>
+              </a:solidFill>
+            </a:ln>
+          </p:spPr>
+          <p:style>
+            <a:lnRef idx="1">
+              <a:schemeClr val="accent1"/>
+            </a:lnRef>
+            <a:fillRef idx="0">
+              <a:schemeClr val="accent1"/>
+            </a:fillRef>
+            <a:effectRef idx="0">
+              <a:schemeClr val="accent1"/>
+            </a:effectRef>
+            <a:fontRef idx="minor">
+              <a:schemeClr val="tx1"/>
+            </a:fontRef>
+          </p:style>
+        </p:cxnSp>
+        <p:cxnSp>
+          <p:nvCxnSpPr>
+            <p:cNvPr id="41" name="Straight Connector 40"/>
+            <p:cNvCxnSpPr>
+              <a:stCxn id="4" idx="2"/>
+            </p:cNvCxnSpPr>
+            <p:nvPr/>
+          </p:nvCxnSpPr>
+          <p:spPr>
+            <a:xfrm>
+              <a:off x="4684465" y="3166160"/>
+              <a:ext cx="1" cy="859022"/>
+            </a:xfrm>
+            <a:prstGeom prst="line">
+              <a:avLst/>
+            </a:prstGeom>
+            <a:ln w="28575">
+              <a:solidFill>
+                <a:schemeClr val="accent6"/>
+              </a:solidFill>
+            </a:ln>
+          </p:spPr>
+          <p:style>
+            <a:lnRef idx="1">
+              <a:schemeClr val="accent1"/>
+            </a:lnRef>
+            <a:fillRef idx="0">
+              <a:schemeClr val="accent1"/>
+            </a:fillRef>
+            <a:effectRef idx="0">
+              <a:schemeClr val="accent1"/>
+            </a:effectRef>
+            <a:fontRef idx="minor">
+              <a:schemeClr val="tx1"/>
+            </a:fontRef>
+          </p:style>
+        </p:cxnSp>
+        <p:cxnSp>
+          <p:nvCxnSpPr>
+            <p:cNvPr id="43" name="Elbow Connector 42"/>
+            <p:cNvCxnSpPr>
+              <a:endCxn id="19" idx="0"/>
+            </p:cNvCxnSpPr>
+            <p:nvPr/>
+          </p:nvCxnSpPr>
+          <p:spPr>
+            <a:xfrm rot="10800000" flipV="1">
+              <a:off x="2965979" y="3649979"/>
+              <a:ext cx="1718486" cy="375203"/>
+            </a:xfrm>
+            <a:prstGeom prst="bentConnector2">
+              <a:avLst/>
+            </a:prstGeom>
+            <a:ln w="28575">
+              <a:solidFill>
+                <a:schemeClr val="accent6"/>
+              </a:solidFill>
+            </a:ln>
+          </p:spPr>
+          <p:style>
+            <a:lnRef idx="1">
+              <a:schemeClr val="accent1"/>
+            </a:lnRef>
+            <a:fillRef idx="0">
+              <a:schemeClr val="accent1"/>
+            </a:fillRef>
+            <a:effectRef idx="0">
+              <a:schemeClr val="accent1"/>
+            </a:effectRef>
+            <a:fontRef idx="minor">
+              <a:schemeClr val="tx1"/>
+            </a:fontRef>
+          </p:style>
+        </p:cxnSp>
+        <p:cxnSp>
+          <p:nvCxnSpPr>
+            <p:cNvPr id="45" name="Elbow Connector 44"/>
+            <p:cNvCxnSpPr>
+              <a:endCxn id="13" idx="0"/>
+            </p:cNvCxnSpPr>
+            <p:nvPr/>
+          </p:nvCxnSpPr>
+          <p:spPr>
+            <a:xfrm>
+              <a:off x="4684466" y="3649980"/>
+              <a:ext cx="1794686" cy="367582"/>
+            </a:xfrm>
+            <a:prstGeom prst="bentConnector2">
+              <a:avLst/>
+            </a:prstGeom>
+            <a:ln w="28575">
+              <a:solidFill>
+                <a:schemeClr val="accent6"/>
+              </a:solidFill>
+            </a:ln>
+          </p:spPr>
+          <p:style>
+            <a:lnRef idx="1">
+              <a:schemeClr val="accent1"/>
+            </a:lnRef>
+            <a:fillRef idx="0">
+              <a:schemeClr val="accent1"/>
+            </a:fillRef>
+            <a:effectRef idx="0">
+              <a:schemeClr val="accent1"/>
+            </a:effectRef>
+            <a:fontRef idx="minor">
+              <a:schemeClr val="tx1"/>
+            </a:fontRef>
+          </p:style>
+        </p:cxnSp>
+        <p:sp>
+          <p:nvSpPr>
+            <p:cNvPr id="56" name="Rectangle 45"/>
+            <p:cNvSpPr/>
+            <p:nvPr/>
+          </p:nvSpPr>
+          <p:spPr>
+            <a:xfrm>
+              <a:off x="4011330" y="4017562"/>
+              <a:ext cx="1354154" cy="354381"/>
+            </a:xfrm>
+            <a:prstGeom prst="roundRect">
+              <a:avLst/>
+            </a:prstGeom>
+            <a:ln/>
+          </p:spPr>
+          <p:style>
+            <a:lnRef idx="2">
+              <a:schemeClr val="accent1"/>
+            </a:lnRef>
+            <a:fillRef idx="1">
+              <a:schemeClr val="lt1"/>
+            </a:fillRef>
+            <a:effectRef idx="0">
+              <a:schemeClr val="accent1"/>
+            </a:effectRef>
+            <a:fontRef idx="minor">
+              <a:schemeClr val="dk1"/>
+            </a:fontRef>
+          </p:style>
+          <p:txBody>
+            <a:bodyPr rtlCol="0" anchor="ctr"/>
+            <a:lstStyle/>
+            <a:p>
+              <a:pPr algn="ctr"/>
+              <a:r>
+                <a:rPr lang="en-US" sz="1200" dirty="0" smtClean="0">
+                  <a:solidFill>
+                    <a:schemeClr val="tx1"/>
+                  </a:solidFill>
+                </a:rPr>
+                <a:t>: </a:t>
+              </a:r>
+              <a:r>
+                <a:rPr lang="en-US" sz="1200" dirty="0" err="1" smtClean="0">
+                  <a:solidFill>
+                    <a:schemeClr val="tx1"/>
+                  </a:solidFill>
+                </a:rPr>
+                <a:t>Config</a:t>
+              </a:r>
+              <a:endParaRPr lang="en-SG" sz="1200" dirty="0">
+                <a:solidFill>
+                  <a:schemeClr val="tx1"/>
+                </a:solidFill>
+              </a:endParaRPr>
+            </a:p>
+          </p:txBody>
+        </p:sp>
+      </p:grpSp>
     </p:spTree>
     <p:extLst>
       <p:ext uri="{BB962C8B-B14F-4D97-AF65-F5344CB8AC3E}">

</xml_diff>

<commit_message>
Add sequence diagram for load command
</commit_message>
<xml_diff>
--- a/docs/diagrams/Diagrams.pptx
+++ b/docs/diagrams/Diagrams.pptx
@@ -118,7 +118,7 @@
   </p:defaultTextStyle>
   <p:extLst>
     <p:ext uri="{EFAFB233-063F-42B5-8137-9DF3F51BA10A}">
-      <p15:sldGuideLst xmlns="" xmlns:p15="http://schemas.microsoft.com/office/powerpoint/2012/main">
+      <p15:sldGuideLst xmlns:p15="http://schemas.microsoft.com/office/powerpoint/2012/main" xmlns="">
         <p15:guide id="1" orient="horz" pos="1488">
           <p15:clr>
             <a:srgbClr val="A4A3A4"/>
@@ -3553,6 +3553,1563 @@
           <a:chExt cx="0" cy="0"/>
         </a:xfrm>
       </p:grpSpPr>
+      <p:grpSp>
+        <p:nvGrpSpPr>
+          <p:cNvPr id="88" name="Group 87"/>
+          <p:cNvGrpSpPr/>
+          <p:nvPr/>
+        </p:nvGrpSpPr>
+        <p:grpSpPr>
+          <a:xfrm>
+            <a:off x="152400" y="2271466"/>
+            <a:ext cx="8904368" cy="3367334"/>
+            <a:chOff x="64408" y="2271466"/>
+            <a:chExt cx="8904368" cy="3367334"/>
+          </a:xfrm>
+        </p:grpSpPr>
+        <p:sp>
+          <p:nvSpPr>
+            <p:cNvPr id="4" name="Rectangle 62"/>
+            <p:cNvSpPr/>
+            <p:nvPr/>
+          </p:nvSpPr>
+          <p:spPr>
+            <a:xfrm>
+              <a:off x="1426783" y="2271466"/>
+              <a:ext cx="1093635" cy="346760"/>
+            </a:xfrm>
+            <a:prstGeom prst="rect">
+              <a:avLst/>
+            </a:prstGeom>
+            <a:solidFill>
+              <a:srgbClr val="7030A0"/>
+            </a:solidFill>
+            <a:ln w="19050">
+              <a:solidFill>
+                <a:srgbClr val="7030A0"/>
+              </a:solidFill>
+            </a:ln>
+            <a:effectLst/>
+          </p:spPr>
+          <p:style>
+            <a:lnRef idx="1">
+              <a:schemeClr val="accent2"/>
+            </a:lnRef>
+            <a:fillRef idx="2">
+              <a:schemeClr val="accent2"/>
+            </a:fillRef>
+            <a:effectRef idx="1">
+              <a:schemeClr val="accent2"/>
+            </a:effectRef>
+            <a:fontRef idx="minor">
+              <a:schemeClr val="dk1"/>
+            </a:fontRef>
+          </p:style>
+          <p:txBody>
+            <a:bodyPr rtlCol="0" anchor="ctr"/>
+            <a:lstStyle/>
+            <a:p>
+              <a:pPr algn="ctr"/>
+              <a:r>
+                <a:rPr lang="en-US" sz="1600" dirty="0" smtClean="0">
+                  <a:solidFill>
+                    <a:schemeClr val="bg1"/>
+                  </a:solidFill>
+                </a:rPr>
+                <a:t>:Model</a:t>
+              </a:r>
+              <a:endParaRPr lang="en-SG" sz="1600" dirty="0">
+                <a:solidFill>
+                  <a:schemeClr val="bg1"/>
+                </a:solidFill>
+              </a:endParaRPr>
+            </a:p>
+          </p:txBody>
+        </p:sp>
+        <p:cxnSp>
+          <p:nvCxnSpPr>
+            <p:cNvPr id="5" name="Straight Connector 4"/>
+            <p:cNvCxnSpPr/>
+            <p:nvPr/>
+          </p:nvCxnSpPr>
+          <p:spPr>
+            <a:xfrm flipH="1">
+              <a:off x="1973600" y="2635137"/>
+              <a:ext cx="3" cy="3003663"/>
+            </a:xfrm>
+            <a:prstGeom prst="line">
+              <a:avLst/>
+            </a:prstGeom>
+            <a:ln w="19050">
+              <a:solidFill>
+                <a:srgbClr val="7030A0"/>
+              </a:solidFill>
+              <a:prstDash val="sysDash"/>
+            </a:ln>
+            <a:effectLst/>
+          </p:spPr>
+          <p:style>
+            <a:lnRef idx="1">
+              <a:schemeClr val="accent1"/>
+            </a:lnRef>
+            <a:fillRef idx="2">
+              <a:schemeClr val="accent1"/>
+            </a:fillRef>
+            <a:effectRef idx="1">
+              <a:schemeClr val="accent1"/>
+            </a:effectRef>
+            <a:fontRef idx="minor">
+              <a:schemeClr val="dk1"/>
+            </a:fontRef>
+          </p:style>
+        </p:cxnSp>
+        <p:sp>
+          <p:nvSpPr>
+            <p:cNvPr id="6" name="Rectangle 5"/>
+            <p:cNvSpPr/>
+            <p:nvPr/>
+          </p:nvSpPr>
+          <p:spPr>
+            <a:xfrm>
+              <a:off x="1901592" y="3201948"/>
+              <a:ext cx="142006" cy="2284452"/>
+            </a:xfrm>
+            <a:prstGeom prst="rect">
+              <a:avLst/>
+            </a:prstGeom>
+            <a:solidFill>
+              <a:srgbClr val="7030A0"/>
+            </a:solidFill>
+            <a:ln>
+              <a:solidFill>
+                <a:srgbClr val="7030A0"/>
+              </a:solidFill>
+            </a:ln>
+            <a:effectLst/>
+          </p:spPr>
+          <p:style>
+            <a:lnRef idx="1">
+              <a:schemeClr val="accent3"/>
+            </a:lnRef>
+            <a:fillRef idx="2">
+              <a:schemeClr val="accent3"/>
+            </a:fillRef>
+            <a:effectRef idx="1">
+              <a:schemeClr val="accent3"/>
+            </a:effectRef>
+            <a:fontRef idx="minor">
+              <a:schemeClr val="dk1"/>
+            </a:fontRef>
+          </p:style>
+          <p:txBody>
+            <a:bodyPr rtlCol="0" anchor="ctr"/>
+            <a:lstStyle/>
+            <a:p>
+              <a:pPr algn="ctr"/>
+              <a:endParaRPr lang="en-SG" sz="1400">
+                <a:solidFill>
+                  <a:schemeClr val="dk1"/>
+                </a:solidFill>
+              </a:endParaRPr>
+            </a:p>
+          </p:txBody>
+        </p:sp>
+        <p:cxnSp>
+          <p:nvCxnSpPr>
+            <p:cNvPr id="7" name="Straight Arrow Connector 6"/>
+            <p:cNvCxnSpPr/>
+            <p:nvPr/>
+          </p:nvCxnSpPr>
+          <p:spPr>
+            <a:xfrm>
+              <a:off x="64408" y="3201949"/>
+              <a:ext cx="1837184" cy="0"/>
+            </a:xfrm>
+            <a:prstGeom prst="straightConnector1">
+              <a:avLst/>
+            </a:prstGeom>
+            <a:ln w="19050">
+              <a:solidFill>
+                <a:srgbClr val="0070C0"/>
+              </a:solidFill>
+              <a:tailEnd type="arrow"/>
+            </a:ln>
+          </p:spPr>
+          <p:style>
+            <a:lnRef idx="1">
+              <a:schemeClr val="accent1"/>
+            </a:lnRef>
+            <a:fillRef idx="0">
+              <a:schemeClr val="accent1"/>
+            </a:fillRef>
+            <a:effectRef idx="0">
+              <a:schemeClr val="accent1"/>
+            </a:effectRef>
+            <a:fontRef idx="minor">
+              <a:schemeClr val="tx1"/>
+            </a:fontRef>
+          </p:style>
+        </p:cxnSp>
+        <p:sp>
+          <p:nvSpPr>
+            <p:cNvPr id="8" name="TextBox 7"/>
+            <p:cNvSpPr txBox="1"/>
+            <p:nvPr/>
+          </p:nvSpPr>
+          <p:spPr>
+            <a:xfrm>
+              <a:off x="139991" y="2766534"/>
+              <a:ext cx="1686018" cy="430887"/>
+            </a:xfrm>
+            <a:prstGeom prst="rect">
+              <a:avLst/>
+            </a:prstGeom>
+            <a:noFill/>
+          </p:spPr>
+          <p:txBody>
+            <a:bodyPr wrap="square" lIns="0" tIns="0" rIns="0" bIns="0" rtlCol="0">
+              <a:spAutoFit/>
+            </a:bodyPr>
+            <a:lstStyle/>
+            <a:p>
+              <a:pPr algn="ctr"/>
+              <a:r>
+                <a:rPr lang="en-US" sz="1400" dirty="0" err="1" smtClean="0">
+                  <a:solidFill>
+                    <a:srgbClr val="7030A0"/>
+                  </a:solidFill>
+                </a:rPr>
+                <a:t>loadFromLocation</a:t>
+              </a:r>
+              <a:endParaRPr lang="en-US" sz="1400" dirty="0" smtClean="0">
+                <a:solidFill>
+                  <a:srgbClr val="7030A0"/>
+                </a:solidFill>
+              </a:endParaRPr>
+            </a:p>
+            <a:p>
+              <a:pPr algn="ctr"/>
+              <a:r>
+                <a:rPr lang="en-US" sz="1400" dirty="0" smtClean="0">
+                  <a:solidFill>
+                    <a:srgbClr val="7030A0"/>
+                  </a:solidFill>
+                </a:rPr>
+                <a:t>(</a:t>
+              </a:r>
+              <a:r>
+                <a:rPr lang="en-US" altLang="zh-CN" sz="1400" dirty="0" smtClean="0">
+                  <a:solidFill>
+                    <a:srgbClr val="7030A0"/>
+                  </a:solidFill>
+                </a:rPr>
+                <a:t>location</a:t>
+              </a:r>
+              <a:r>
+                <a:rPr lang="en-US" sz="1400" dirty="0" smtClean="0">
+                  <a:solidFill>
+                    <a:srgbClr val="7030A0"/>
+                  </a:solidFill>
+                </a:rPr>
+                <a:t>)</a:t>
+              </a:r>
+              <a:endParaRPr lang="en-US" sz="1400" dirty="0">
+                <a:solidFill>
+                  <a:srgbClr val="7030A0"/>
+                </a:solidFill>
+              </a:endParaRPr>
+            </a:p>
+          </p:txBody>
+        </p:sp>
+        <p:sp>
+          <p:nvSpPr>
+            <p:cNvPr id="11" name="Rectangle 62"/>
+            <p:cNvSpPr/>
+            <p:nvPr/>
+          </p:nvSpPr>
+          <p:spPr>
+            <a:xfrm>
+              <a:off x="3812402" y="2288377"/>
+              <a:ext cx="1371600" cy="346760"/>
+            </a:xfrm>
+            <a:prstGeom prst="rect">
+              <a:avLst/>
+            </a:prstGeom>
+            <a:solidFill>
+              <a:schemeClr val="accent5">
+                <a:lumMod val="75000"/>
+              </a:schemeClr>
+            </a:solidFill>
+            <a:ln w="19050">
+              <a:solidFill>
+                <a:schemeClr val="accent5">
+                  <a:lumMod val="75000"/>
+                </a:schemeClr>
+              </a:solidFill>
+            </a:ln>
+            <a:effectLst/>
+          </p:spPr>
+          <p:style>
+            <a:lnRef idx="1">
+              <a:schemeClr val="accent2"/>
+            </a:lnRef>
+            <a:fillRef idx="2">
+              <a:schemeClr val="accent2"/>
+            </a:fillRef>
+            <a:effectRef idx="1">
+              <a:schemeClr val="accent2"/>
+            </a:effectRef>
+            <a:fontRef idx="minor">
+              <a:schemeClr val="dk1"/>
+            </a:fontRef>
+          </p:style>
+          <p:txBody>
+            <a:bodyPr rtlCol="0" anchor="ctr"/>
+            <a:lstStyle/>
+            <a:p>
+              <a:pPr algn="ctr"/>
+              <a:r>
+                <a:rPr lang="en-US" sz="1600" dirty="0" smtClean="0">
+                  <a:solidFill>
+                    <a:schemeClr val="bg1"/>
+                  </a:solidFill>
+                </a:rPr>
+                <a:t>:</a:t>
+              </a:r>
+              <a:r>
+                <a:rPr lang="en-US" sz="1600" dirty="0" err="1" smtClean="0">
+                  <a:solidFill>
+                    <a:schemeClr val="bg1"/>
+                  </a:solidFill>
+                </a:rPr>
+                <a:t>EventsCenter</a:t>
+              </a:r>
+              <a:endParaRPr lang="en-SG" sz="1600" dirty="0">
+                <a:solidFill>
+                  <a:schemeClr val="bg1"/>
+                </a:solidFill>
+              </a:endParaRPr>
+            </a:p>
+          </p:txBody>
+        </p:sp>
+        <p:sp>
+          <p:nvSpPr>
+            <p:cNvPr id="13" name="Rectangle 12"/>
+            <p:cNvSpPr/>
+            <p:nvPr/>
+          </p:nvSpPr>
+          <p:spPr>
+            <a:xfrm>
+              <a:off x="4419600" y="3429001"/>
+              <a:ext cx="152948" cy="1828799"/>
+            </a:xfrm>
+            <a:prstGeom prst="rect">
+              <a:avLst/>
+            </a:prstGeom>
+            <a:solidFill>
+              <a:schemeClr val="accent5">
+                <a:lumMod val="75000"/>
+              </a:schemeClr>
+            </a:solidFill>
+            <a:ln>
+              <a:solidFill>
+                <a:schemeClr val="accent5">
+                  <a:lumMod val="75000"/>
+                </a:schemeClr>
+              </a:solidFill>
+            </a:ln>
+            <a:effectLst/>
+          </p:spPr>
+          <p:style>
+            <a:lnRef idx="1">
+              <a:schemeClr val="accent3"/>
+            </a:lnRef>
+            <a:fillRef idx="2">
+              <a:schemeClr val="accent3"/>
+            </a:fillRef>
+            <a:effectRef idx="1">
+              <a:schemeClr val="accent3"/>
+            </a:effectRef>
+            <a:fontRef idx="minor">
+              <a:schemeClr val="dk1"/>
+            </a:fontRef>
+          </p:style>
+          <p:txBody>
+            <a:bodyPr rtlCol="0" anchor="ctr"/>
+            <a:lstStyle/>
+            <a:p>
+              <a:pPr algn="ctr"/>
+              <a:endParaRPr lang="en-SG" sz="1400">
+                <a:solidFill>
+                  <a:schemeClr val="dk1"/>
+                </a:solidFill>
+              </a:endParaRPr>
+            </a:p>
+          </p:txBody>
+        </p:sp>
+        <p:grpSp>
+          <p:nvGrpSpPr>
+            <p:cNvPr id="34" name="Group 33"/>
+            <p:cNvGrpSpPr/>
+            <p:nvPr/>
+          </p:nvGrpSpPr>
+          <p:grpSpPr>
+            <a:xfrm>
+              <a:off x="2057792" y="3155454"/>
+              <a:ext cx="2361808" cy="273546"/>
+              <a:chOff x="2053992" y="3351196"/>
+              <a:chExt cx="2361808" cy="273546"/>
+            </a:xfrm>
+          </p:grpSpPr>
+          <p:sp>
+            <p:nvSpPr>
+              <p:cNvPr id="9" name="TextBox 8"/>
+              <p:cNvSpPr txBox="1"/>
+              <p:nvPr/>
+            </p:nvSpPr>
+            <p:spPr>
+              <a:xfrm>
+                <a:off x="2133600" y="3351196"/>
+                <a:ext cx="2159370" cy="215444"/>
+              </a:xfrm>
+              <a:prstGeom prst="rect">
+                <a:avLst/>
+              </a:prstGeom>
+              <a:noFill/>
+            </p:spPr>
+            <p:txBody>
+              <a:bodyPr wrap="square" lIns="0" tIns="0" rIns="0" bIns="0" rtlCol="0">
+                <a:spAutoFit/>
+              </a:bodyPr>
+              <a:lstStyle/>
+              <a:p>
+                <a:pPr algn="ctr"/>
+                <a:r>
+                  <a:rPr lang="en-US" sz="1400" dirty="0">
+                    <a:solidFill>
+                      <a:schemeClr val="accent5">
+                        <a:lumMod val="75000"/>
+                      </a:schemeClr>
+                    </a:solidFill>
+                  </a:rPr>
+                  <a:t>post(</a:t>
+                </a:r>
+                <a:r>
+                  <a:rPr lang="en-US" sz="1400" dirty="0" err="1">
+                    <a:solidFill>
+                      <a:schemeClr val="accent5">
+                        <a:lumMod val="75000"/>
+                      </a:schemeClr>
+                    </a:solidFill>
+                  </a:rPr>
+                  <a:t>LoadDataRequestEvent</a:t>
+                </a:r>
+                <a:r>
+                  <a:rPr lang="en-US" sz="1400" dirty="0">
+                    <a:solidFill>
+                      <a:schemeClr val="accent5">
+                        <a:lumMod val="75000"/>
+                      </a:schemeClr>
+                    </a:solidFill>
+                  </a:rPr>
+                  <a:t>)</a:t>
+                </a:r>
+                <a:endParaRPr lang="en-US" sz="1400" dirty="0">
+                  <a:solidFill>
+                    <a:schemeClr val="accent5">
+                      <a:lumMod val="75000"/>
+                    </a:schemeClr>
+                  </a:solidFill>
+                </a:endParaRPr>
+              </a:p>
+            </p:txBody>
+          </p:sp>
+          <p:cxnSp>
+            <p:nvCxnSpPr>
+              <p:cNvPr id="14" name="Straight Arrow Connector 13"/>
+              <p:cNvCxnSpPr/>
+              <p:nvPr/>
+            </p:nvCxnSpPr>
+            <p:spPr>
+              <a:xfrm>
+                <a:off x="2053992" y="3624742"/>
+                <a:ext cx="2361808" cy="0"/>
+              </a:xfrm>
+              <a:prstGeom prst="straightConnector1">
+                <a:avLst/>
+              </a:prstGeom>
+              <a:ln w="19050">
+                <a:solidFill>
+                  <a:srgbClr val="7030A0"/>
+                </a:solidFill>
+                <a:tailEnd type="arrow"/>
+              </a:ln>
+            </p:spPr>
+            <p:style>
+              <a:lnRef idx="1">
+                <a:schemeClr val="accent1"/>
+              </a:lnRef>
+              <a:fillRef idx="0">
+                <a:schemeClr val="accent1"/>
+              </a:fillRef>
+              <a:effectRef idx="0">
+                <a:schemeClr val="accent1"/>
+              </a:effectRef>
+              <a:fontRef idx="minor">
+                <a:schemeClr val="tx1"/>
+              </a:fontRef>
+            </p:style>
+          </p:cxnSp>
+        </p:grpSp>
+        <p:cxnSp>
+          <p:nvCxnSpPr>
+            <p:cNvPr id="15" name="Straight Arrow Connector 14"/>
+            <p:cNvCxnSpPr/>
+            <p:nvPr/>
+          </p:nvCxnSpPr>
+          <p:spPr>
+            <a:xfrm>
+              <a:off x="2043598" y="4426734"/>
+              <a:ext cx="2376002" cy="0"/>
+            </a:xfrm>
+            <a:prstGeom prst="straightConnector1">
+              <a:avLst/>
+            </a:prstGeom>
+            <a:ln w="19050">
+              <a:solidFill>
+                <a:schemeClr val="accent5">
+                  <a:lumMod val="75000"/>
+                </a:schemeClr>
+              </a:solidFill>
+              <a:prstDash val="solid"/>
+              <a:headEnd type="arrow" w="med" len="med"/>
+              <a:tailEnd type="none" w="med" len="med"/>
+            </a:ln>
+          </p:spPr>
+          <p:style>
+            <a:lnRef idx="1">
+              <a:schemeClr val="accent1"/>
+            </a:lnRef>
+            <a:fillRef idx="0">
+              <a:schemeClr val="accent1"/>
+            </a:fillRef>
+            <a:effectRef idx="0">
+              <a:schemeClr val="accent1"/>
+            </a:effectRef>
+            <a:fontRef idx="minor">
+              <a:schemeClr val="tx1"/>
+            </a:fontRef>
+          </p:style>
+        </p:cxnSp>
+        <p:sp>
+          <p:nvSpPr>
+            <p:cNvPr id="17" name="Rectangle 62"/>
+            <p:cNvSpPr/>
+            <p:nvPr/>
+          </p:nvSpPr>
+          <p:spPr>
+            <a:xfrm>
+              <a:off x="7405679" y="2288377"/>
+              <a:ext cx="1093635" cy="346760"/>
+            </a:xfrm>
+            <a:prstGeom prst="rect">
+              <a:avLst/>
+            </a:prstGeom>
+            <a:solidFill>
+              <a:schemeClr val="accent6">
+                <a:lumMod val="75000"/>
+              </a:schemeClr>
+            </a:solidFill>
+            <a:ln w="19050">
+              <a:solidFill>
+                <a:schemeClr val="accent6">
+                  <a:lumMod val="75000"/>
+                </a:schemeClr>
+              </a:solidFill>
+            </a:ln>
+            <a:effectLst/>
+          </p:spPr>
+          <p:style>
+            <a:lnRef idx="1">
+              <a:schemeClr val="accent2"/>
+            </a:lnRef>
+            <a:fillRef idx="2">
+              <a:schemeClr val="accent2"/>
+            </a:fillRef>
+            <a:effectRef idx="1">
+              <a:schemeClr val="accent2"/>
+            </a:effectRef>
+            <a:fontRef idx="minor">
+              <a:schemeClr val="dk1"/>
+            </a:fontRef>
+          </p:style>
+          <p:txBody>
+            <a:bodyPr rtlCol="0" anchor="ctr"/>
+            <a:lstStyle/>
+            <a:p>
+              <a:pPr algn="ctr"/>
+              <a:r>
+                <a:rPr lang="en-US" sz="1600" dirty="0" smtClean="0">
+                  <a:solidFill>
+                    <a:schemeClr val="bg1"/>
+                  </a:solidFill>
+                </a:rPr>
+                <a:t>:Storage</a:t>
+              </a:r>
+              <a:endParaRPr lang="en-SG" sz="1600" dirty="0">
+                <a:solidFill>
+                  <a:schemeClr val="bg1"/>
+                </a:solidFill>
+              </a:endParaRPr>
+            </a:p>
+          </p:txBody>
+        </p:sp>
+        <p:cxnSp>
+          <p:nvCxnSpPr>
+            <p:cNvPr id="18" name="Straight Connector 17"/>
+            <p:cNvCxnSpPr/>
+            <p:nvPr/>
+          </p:nvCxnSpPr>
+          <p:spPr>
+            <a:xfrm>
+              <a:off x="7962266" y="2667000"/>
+              <a:ext cx="0" cy="2743200"/>
+            </a:xfrm>
+            <a:prstGeom prst="line">
+              <a:avLst/>
+            </a:prstGeom>
+            <a:ln w="19050">
+              <a:solidFill>
+                <a:schemeClr val="accent6">
+                  <a:lumMod val="75000"/>
+                </a:schemeClr>
+              </a:solidFill>
+              <a:prstDash val="sysDash"/>
+            </a:ln>
+            <a:effectLst/>
+          </p:spPr>
+          <p:style>
+            <a:lnRef idx="1">
+              <a:schemeClr val="accent1"/>
+            </a:lnRef>
+            <a:fillRef idx="2">
+              <a:schemeClr val="accent1"/>
+            </a:fillRef>
+            <a:effectRef idx="1">
+              <a:schemeClr val="accent1"/>
+            </a:effectRef>
+            <a:fontRef idx="minor">
+              <a:schemeClr val="dk1"/>
+            </a:fontRef>
+          </p:style>
+        </p:cxnSp>
+        <p:sp>
+          <p:nvSpPr>
+            <p:cNvPr id="19" name="Rectangle 18"/>
+            <p:cNvSpPr/>
+            <p:nvPr/>
+          </p:nvSpPr>
+          <p:spPr>
+            <a:xfrm>
+              <a:off x="7890257" y="3625927"/>
+              <a:ext cx="140896" cy="565073"/>
+            </a:xfrm>
+            <a:prstGeom prst="rect">
+              <a:avLst/>
+            </a:prstGeom>
+            <a:solidFill>
+              <a:schemeClr val="accent6">
+                <a:lumMod val="75000"/>
+              </a:schemeClr>
+            </a:solidFill>
+            <a:ln>
+              <a:solidFill>
+                <a:schemeClr val="accent6">
+                  <a:lumMod val="75000"/>
+                </a:schemeClr>
+              </a:solidFill>
+            </a:ln>
+            <a:effectLst/>
+          </p:spPr>
+          <p:style>
+            <a:lnRef idx="1">
+              <a:schemeClr val="accent3"/>
+            </a:lnRef>
+            <a:fillRef idx="2">
+              <a:schemeClr val="accent3"/>
+            </a:fillRef>
+            <a:effectRef idx="1">
+              <a:schemeClr val="accent3"/>
+            </a:effectRef>
+            <a:fontRef idx="minor">
+              <a:schemeClr val="dk1"/>
+            </a:fontRef>
+          </p:style>
+          <p:txBody>
+            <a:bodyPr rtlCol="0" anchor="ctr"/>
+            <a:lstStyle/>
+            <a:p>
+              <a:pPr algn="ctr"/>
+              <a:endParaRPr lang="en-SG" sz="1400">
+                <a:solidFill>
+                  <a:schemeClr val="dk1"/>
+                </a:solidFill>
+              </a:endParaRPr>
+            </a:p>
+          </p:txBody>
+        </p:sp>
+        <p:cxnSp>
+          <p:nvCxnSpPr>
+            <p:cNvPr id="20" name="Straight Arrow Connector 19"/>
+            <p:cNvCxnSpPr>
+              <a:stCxn id="19" idx="2"/>
+            </p:cNvCxnSpPr>
+            <p:nvPr/>
+          </p:nvCxnSpPr>
+          <p:spPr>
+            <a:xfrm flipH="1">
+              <a:off x="4572000" y="4191000"/>
+              <a:ext cx="3388705" cy="0"/>
+            </a:xfrm>
+            <a:prstGeom prst="straightConnector1">
+              <a:avLst/>
+            </a:prstGeom>
+            <a:ln w="19050">
+              <a:solidFill>
+                <a:schemeClr val="accent6">
+                  <a:lumMod val="75000"/>
+                </a:schemeClr>
+              </a:solidFill>
+              <a:prstDash val="solid"/>
+              <a:headEnd type="none" w="med" len="med"/>
+              <a:tailEnd type="arrow" w="med" len="med"/>
+            </a:ln>
+          </p:spPr>
+          <p:style>
+            <a:lnRef idx="1">
+              <a:schemeClr val="accent1"/>
+            </a:lnRef>
+            <a:fillRef idx="0">
+              <a:schemeClr val="accent1"/>
+            </a:fillRef>
+            <a:effectRef idx="0">
+              <a:schemeClr val="accent1"/>
+            </a:effectRef>
+            <a:fontRef idx="minor">
+              <a:schemeClr val="tx1"/>
+            </a:fontRef>
+          </p:style>
+        </p:cxnSp>
+        <p:cxnSp>
+          <p:nvCxnSpPr>
+            <p:cNvPr id="21" name="Straight Connector 20"/>
+            <p:cNvCxnSpPr/>
+            <p:nvPr/>
+          </p:nvCxnSpPr>
+          <p:spPr>
+            <a:xfrm>
+              <a:off x="4498202" y="2590800"/>
+              <a:ext cx="0" cy="2895600"/>
+            </a:xfrm>
+            <a:prstGeom prst="line">
+              <a:avLst/>
+            </a:prstGeom>
+            <a:ln w="19050">
+              <a:solidFill>
+                <a:schemeClr val="accent5">
+                  <a:lumMod val="75000"/>
+                </a:schemeClr>
+              </a:solidFill>
+              <a:prstDash val="sysDash"/>
+            </a:ln>
+            <a:effectLst/>
+          </p:spPr>
+          <p:style>
+            <a:lnRef idx="1">
+              <a:schemeClr val="accent1"/>
+            </a:lnRef>
+            <a:fillRef idx="2">
+              <a:schemeClr val="accent1"/>
+            </a:fillRef>
+            <a:effectRef idx="1">
+              <a:schemeClr val="accent1"/>
+            </a:effectRef>
+            <a:fontRef idx="minor">
+              <a:schemeClr val="dk1"/>
+            </a:fontRef>
+          </p:style>
+        </p:cxnSp>
+        <p:cxnSp>
+          <p:nvCxnSpPr>
+            <p:cNvPr id="22" name="Straight Arrow Connector 21"/>
+            <p:cNvCxnSpPr/>
+            <p:nvPr/>
+          </p:nvCxnSpPr>
+          <p:spPr>
+            <a:xfrm>
+              <a:off x="4572000" y="3664717"/>
+              <a:ext cx="3318258" cy="0"/>
+            </a:xfrm>
+            <a:prstGeom prst="straightConnector1">
+              <a:avLst/>
+            </a:prstGeom>
+            <a:ln w="19050">
+              <a:solidFill>
+                <a:schemeClr val="accent5">
+                  <a:lumMod val="75000"/>
+                </a:schemeClr>
+              </a:solidFill>
+              <a:headEnd type="none" w="med" len="med"/>
+              <a:tailEnd type="arrow" w="med" len="med"/>
+            </a:ln>
+          </p:spPr>
+          <p:style>
+            <a:lnRef idx="1">
+              <a:schemeClr val="accent1"/>
+            </a:lnRef>
+            <a:fillRef idx="0">
+              <a:schemeClr val="accent1"/>
+            </a:fillRef>
+            <a:effectRef idx="0">
+              <a:schemeClr val="accent1"/>
+            </a:effectRef>
+            <a:fontRef idx="minor">
+              <a:schemeClr val="tx1"/>
+            </a:fontRef>
+          </p:style>
+        </p:cxnSp>
+        <p:sp>
+          <p:nvSpPr>
+            <p:cNvPr id="23" name="TextBox 22"/>
+            <p:cNvSpPr txBox="1"/>
+            <p:nvPr/>
+          </p:nvSpPr>
+          <p:spPr>
+            <a:xfrm>
+              <a:off x="5165906" y="3356176"/>
+              <a:ext cx="2355070" cy="215444"/>
+            </a:xfrm>
+            <a:prstGeom prst="rect">
+              <a:avLst/>
+            </a:prstGeom>
+            <a:noFill/>
+          </p:spPr>
+          <p:txBody>
+            <a:bodyPr wrap="square" lIns="0" tIns="0" rIns="0" bIns="0" rtlCol="0">
+              <a:spAutoFit/>
+            </a:bodyPr>
+            <a:lstStyle/>
+            <a:p>
+              <a:r>
+                <a:rPr lang="en-US" sz="1400" dirty="0" err="1" smtClean="0">
+                  <a:solidFill>
+                    <a:schemeClr val="accent6">
+                      <a:lumMod val="75000"/>
+                    </a:schemeClr>
+                  </a:solidFill>
+                </a:rPr>
+                <a:t>handleLoadDataRequestEvent</a:t>
+              </a:r>
+              <a:r>
+                <a:rPr lang="en-US" sz="1400" dirty="0" smtClean="0">
+                  <a:solidFill>
+                    <a:schemeClr val="accent6">
+                      <a:lumMod val="75000"/>
+                    </a:schemeClr>
+                  </a:solidFill>
+                </a:rPr>
+                <a:t>()</a:t>
+              </a:r>
+              <a:endParaRPr lang="en-US" sz="1400" dirty="0">
+                <a:solidFill>
+                  <a:schemeClr val="accent6">
+                    <a:lumMod val="75000"/>
+                  </a:schemeClr>
+                </a:solidFill>
+              </a:endParaRPr>
+            </a:p>
+          </p:txBody>
+        </p:sp>
+        <p:grpSp>
+          <p:nvGrpSpPr>
+            <p:cNvPr id="24" name="Group 23"/>
+            <p:cNvGrpSpPr/>
+            <p:nvPr/>
+          </p:nvGrpSpPr>
+          <p:grpSpPr>
+            <a:xfrm flipH="1">
+              <a:off x="7982113" y="3695010"/>
+              <a:ext cx="217349" cy="270072"/>
+              <a:chOff x="1028134" y="5612032"/>
+              <a:chExt cx="217349" cy="270072"/>
+            </a:xfrm>
+          </p:grpSpPr>
+          <p:sp>
+            <p:nvSpPr>
+              <p:cNvPr id="25" name="Freeform 24"/>
+              <p:cNvSpPr/>
+              <p:nvPr/>
+            </p:nvSpPr>
+            <p:spPr>
+              <a:xfrm rot="2600998" flipH="1" flipV="1">
+                <a:off x="1028134" y="5612032"/>
+                <a:ext cx="167452" cy="116880"/>
+              </a:xfrm>
+              <a:custGeom>
+                <a:avLst/>
+                <a:gdLst>
+                  <a:gd name="connsiteX0" fmla="*/ 0 w 226400"/>
+                  <a:gd name="connsiteY0" fmla="*/ 32920 h 171466"/>
+                  <a:gd name="connsiteX1" fmla="*/ 157018 w 226400"/>
+                  <a:gd name="connsiteY1" fmla="*/ 5211 h 171466"/>
+                  <a:gd name="connsiteX2" fmla="*/ 221673 w 226400"/>
+                  <a:gd name="connsiteY2" fmla="*/ 125284 h 171466"/>
+                  <a:gd name="connsiteX3" fmla="*/ 36945 w 226400"/>
+                  <a:gd name="connsiteY3" fmla="*/ 171466 h 171466"/>
+                </a:gdLst>
+                <a:ahLst/>
+                <a:cxnLst>
+                  <a:cxn ang="0">
+                    <a:pos x="connsiteX0" y="connsiteY0"/>
+                  </a:cxn>
+                  <a:cxn ang="0">
+                    <a:pos x="connsiteX1" y="connsiteY1"/>
+                  </a:cxn>
+                  <a:cxn ang="0">
+                    <a:pos x="connsiteX2" y="connsiteY2"/>
+                  </a:cxn>
+                  <a:cxn ang="0">
+                    <a:pos x="connsiteX3" y="connsiteY3"/>
+                  </a:cxn>
+                </a:cxnLst>
+                <a:rect l="l" t="t" r="r" b="b"/>
+                <a:pathLst>
+                  <a:path w="226400" h="171466">
+                    <a:moveTo>
+                      <a:pt x="0" y="32920"/>
+                    </a:moveTo>
+                    <a:cubicBezTo>
+                      <a:pt x="60036" y="11368"/>
+                      <a:pt x="120073" y="-10183"/>
+                      <a:pt x="157018" y="5211"/>
+                    </a:cubicBezTo>
+                    <a:cubicBezTo>
+                      <a:pt x="193963" y="20605"/>
+                      <a:pt x="241685" y="97575"/>
+                      <a:pt x="221673" y="125284"/>
+                    </a:cubicBezTo>
+                    <a:cubicBezTo>
+                      <a:pt x="201661" y="152993"/>
+                      <a:pt x="119303" y="162229"/>
+                      <a:pt x="36945" y="171466"/>
+                    </a:cubicBezTo>
+                  </a:path>
+                </a:pathLst>
+              </a:custGeom>
+              <a:ln w="19050">
+                <a:solidFill>
+                  <a:schemeClr val="accent6">
+                    <a:lumMod val="75000"/>
+                  </a:schemeClr>
+                </a:solidFill>
+                <a:headEnd type="arrow" w="med" len="med"/>
+                <a:tailEnd type="none" w="med" len="med"/>
+              </a:ln>
+            </p:spPr>
+            <p:style>
+              <a:lnRef idx="1">
+                <a:schemeClr val="accent1"/>
+              </a:lnRef>
+              <a:fillRef idx="0">
+                <a:schemeClr val="accent1"/>
+              </a:fillRef>
+              <a:effectRef idx="0">
+                <a:schemeClr val="accent1"/>
+              </a:effectRef>
+              <a:fontRef idx="minor">
+                <a:schemeClr val="tx1"/>
+              </a:fontRef>
+            </p:style>
+            <p:txBody>
+              <a:bodyPr rtlCol="0" anchor="ctr"/>
+              <a:lstStyle/>
+              <a:p>
+                <a:pPr algn="ctr"/>
+                <a:endParaRPr lang="en-SG"/>
+              </a:p>
+            </p:txBody>
+          </p:sp>
+          <p:sp>
+            <p:nvSpPr>
+              <p:cNvPr id="26" name="Rectangle 25"/>
+              <p:cNvSpPr/>
+              <p:nvPr/>
+            </p:nvSpPr>
+            <p:spPr>
+              <a:xfrm>
+                <a:off x="1147403" y="5712513"/>
+                <a:ext cx="98080" cy="169591"/>
+              </a:xfrm>
+              <a:prstGeom prst="rect">
+                <a:avLst/>
+              </a:prstGeom>
+              <a:solidFill>
+                <a:schemeClr val="accent6">
+                  <a:lumMod val="75000"/>
+                </a:schemeClr>
+              </a:solidFill>
+              <a:ln>
+                <a:solidFill>
+                  <a:schemeClr val="bg1"/>
+                </a:solidFill>
+              </a:ln>
+              <a:effectLst/>
+            </p:spPr>
+            <p:style>
+              <a:lnRef idx="1">
+                <a:schemeClr val="accent3"/>
+              </a:lnRef>
+              <a:fillRef idx="2">
+                <a:schemeClr val="accent3"/>
+              </a:fillRef>
+              <a:effectRef idx="1">
+                <a:schemeClr val="accent3"/>
+              </a:effectRef>
+              <a:fontRef idx="minor">
+                <a:schemeClr val="dk1"/>
+              </a:fontRef>
+            </p:style>
+            <p:txBody>
+              <a:bodyPr rtlCol="0" anchor="ctr"/>
+              <a:lstStyle/>
+              <a:p>
+                <a:pPr algn="ctr"/>
+                <a:endParaRPr lang="en-SG" sz="1400">
+                  <a:solidFill>
+                    <a:schemeClr val="dk1"/>
+                  </a:solidFill>
+                </a:endParaRPr>
+              </a:p>
+            </p:txBody>
+          </p:sp>
+        </p:grpSp>
+        <p:sp>
+          <p:nvSpPr>
+            <p:cNvPr id="27" name="TextBox 26"/>
+            <p:cNvSpPr txBox="1"/>
+            <p:nvPr/>
+          </p:nvSpPr>
+          <p:spPr>
+            <a:xfrm>
+              <a:off x="8239560" y="3581400"/>
+              <a:ext cx="729216" cy="430887"/>
+            </a:xfrm>
+            <a:prstGeom prst="rect">
+              <a:avLst/>
+            </a:prstGeom>
+            <a:noFill/>
+          </p:spPr>
+          <p:txBody>
+            <a:bodyPr wrap="square" lIns="0" tIns="0" rIns="0" bIns="0" rtlCol="0">
+              <a:spAutoFit/>
+            </a:bodyPr>
+            <a:lstStyle/>
+            <a:p>
+              <a:r>
+                <a:rPr lang="en-US" sz="1400" dirty="0" smtClean="0">
+                  <a:solidFill>
+                    <a:schemeClr val="accent6">
+                      <a:lumMod val="75000"/>
+                    </a:schemeClr>
+                  </a:solidFill>
+                </a:rPr>
+                <a:t>load from location</a:t>
+              </a:r>
+              <a:endParaRPr lang="en-US" sz="1400" dirty="0">
+                <a:solidFill>
+                  <a:schemeClr val="accent6">
+                    <a:lumMod val="75000"/>
+                  </a:schemeClr>
+                </a:solidFill>
+              </a:endParaRPr>
+            </a:p>
+          </p:txBody>
+        </p:sp>
+        <p:sp>
+          <p:nvSpPr>
+            <p:cNvPr id="36" name="TextBox 35"/>
+            <p:cNvSpPr txBox="1"/>
+            <p:nvPr/>
+          </p:nvSpPr>
+          <p:spPr>
+            <a:xfrm>
+              <a:off x="5108103" y="3962400"/>
+              <a:ext cx="2336673" cy="215444"/>
+            </a:xfrm>
+            <a:prstGeom prst="rect">
+              <a:avLst/>
+            </a:prstGeom>
+            <a:noFill/>
+          </p:spPr>
+          <p:txBody>
+            <a:bodyPr wrap="square" lIns="0" tIns="0" rIns="0" bIns="0" rtlCol="0">
+              <a:spAutoFit/>
+            </a:bodyPr>
+            <a:lstStyle/>
+            <a:p>
+              <a:pPr algn="ctr"/>
+              <a:r>
+                <a:rPr lang="en-US" sz="1400" dirty="0">
+                  <a:solidFill>
+                    <a:schemeClr val="accent6">
+                      <a:lumMod val="75000"/>
+                    </a:schemeClr>
+                  </a:solidFill>
+                </a:rPr>
+                <a:t>post(</a:t>
+              </a:r>
+              <a:r>
+                <a:rPr lang="en-US" sz="1400" dirty="0" err="1">
+                  <a:solidFill>
+                    <a:schemeClr val="accent6">
+                      <a:lumMod val="75000"/>
+                    </a:schemeClr>
+                  </a:solidFill>
+                </a:rPr>
+                <a:t>LoadDataCompleteEvent</a:t>
+              </a:r>
+              <a:r>
+                <a:rPr lang="en-US" sz="1400" dirty="0">
+                  <a:solidFill>
+                    <a:schemeClr val="accent6">
+                      <a:lumMod val="75000"/>
+                    </a:schemeClr>
+                  </a:solidFill>
+                </a:rPr>
+                <a:t>)</a:t>
+              </a:r>
+              <a:endParaRPr lang="en-US" sz="1400" dirty="0">
+                <a:solidFill>
+                  <a:schemeClr val="accent6">
+                    <a:lumMod val="75000"/>
+                  </a:schemeClr>
+                </a:solidFill>
+              </a:endParaRPr>
+            </a:p>
+          </p:txBody>
+        </p:sp>
+        <p:sp>
+          <p:nvSpPr>
+            <p:cNvPr id="39" name="TextBox 38"/>
+            <p:cNvSpPr txBox="1"/>
+            <p:nvPr/>
+          </p:nvSpPr>
+          <p:spPr>
+            <a:xfrm>
+              <a:off x="2319157" y="3895876"/>
+              <a:ext cx="1901084" cy="430887"/>
+            </a:xfrm>
+            <a:prstGeom prst="rect">
+              <a:avLst/>
+            </a:prstGeom>
+            <a:noFill/>
+          </p:spPr>
+          <p:txBody>
+            <a:bodyPr wrap="square" lIns="0" tIns="0" rIns="0" bIns="0" rtlCol="0">
+              <a:spAutoFit/>
+            </a:bodyPr>
+            <a:lstStyle/>
+            <a:p>
+              <a:pPr algn="ctr"/>
+              <a:r>
+                <a:rPr lang="en-US" sz="1400" dirty="0" err="1" smtClean="0">
+                  <a:solidFill>
+                    <a:srgbClr val="7030A0"/>
+                  </a:solidFill>
+                </a:rPr>
+                <a:t>handleLoadDataComplete</a:t>
+              </a:r>
+              <a:endParaRPr lang="en-US" sz="1400" dirty="0" smtClean="0">
+                <a:solidFill>
+                  <a:srgbClr val="7030A0"/>
+                </a:solidFill>
+              </a:endParaRPr>
+            </a:p>
+            <a:p>
+              <a:pPr algn="ctr"/>
+              <a:r>
+                <a:rPr lang="en-US" sz="1400" dirty="0" smtClean="0">
+                  <a:solidFill>
+                    <a:srgbClr val="7030A0"/>
+                  </a:solidFill>
+                </a:rPr>
+                <a:t>Event()</a:t>
+              </a:r>
+            </a:p>
+          </p:txBody>
+        </p:sp>
+        <p:grpSp>
+          <p:nvGrpSpPr>
+            <p:cNvPr id="45" name="Group 44"/>
+            <p:cNvGrpSpPr/>
+            <p:nvPr/>
+          </p:nvGrpSpPr>
+          <p:grpSpPr>
+            <a:xfrm>
+              <a:off x="921674" y="4200833"/>
+              <a:ext cx="1050921" cy="437533"/>
+              <a:chOff x="194562" y="5444571"/>
+              <a:chExt cx="1050921" cy="437533"/>
+            </a:xfrm>
+          </p:grpSpPr>
+          <p:grpSp>
+            <p:nvGrpSpPr>
+              <p:cNvPr id="44" name="Group 43"/>
+              <p:cNvGrpSpPr/>
+              <p:nvPr/>
+            </p:nvGrpSpPr>
+            <p:grpSpPr>
+              <a:xfrm>
+                <a:off x="1028134" y="5612032"/>
+                <a:ext cx="217349" cy="270072"/>
+                <a:chOff x="1028134" y="5612032"/>
+                <a:chExt cx="217349" cy="270072"/>
+              </a:xfrm>
+            </p:grpSpPr>
+            <p:sp>
+              <p:nvSpPr>
+                <p:cNvPr id="41" name="Freeform 40"/>
+                <p:cNvSpPr/>
+                <p:nvPr/>
+              </p:nvSpPr>
+              <p:spPr>
+                <a:xfrm rot="2600998" flipH="1" flipV="1">
+                  <a:off x="1028134" y="5612032"/>
+                  <a:ext cx="167452" cy="116880"/>
+                </a:xfrm>
+                <a:custGeom>
+                  <a:avLst/>
+                  <a:gdLst>
+                    <a:gd name="connsiteX0" fmla="*/ 0 w 226400"/>
+                    <a:gd name="connsiteY0" fmla="*/ 32920 h 171466"/>
+                    <a:gd name="connsiteX1" fmla="*/ 157018 w 226400"/>
+                    <a:gd name="connsiteY1" fmla="*/ 5211 h 171466"/>
+                    <a:gd name="connsiteX2" fmla="*/ 221673 w 226400"/>
+                    <a:gd name="connsiteY2" fmla="*/ 125284 h 171466"/>
+                    <a:gd name="connsiteX3" fmla="*/ 36945 w 226400"/>
+                    <a:gd name="connsiteY3" fmla="*/ 171466 h 171466"/>
+                  </a:gdLst>
+                  <a:ahLst/>
+                  <a:cxnLst>
+                    <a:cxn ang="0">
+                      <a:pos x="connsiteX0" y="connsiteY0"/>
+                    </a:cxn>
+                    <a:cxn ang="0">
+                      <a:pos x="connsiteX1" y="connsiteY1"/>
+                    </a:cxn>
+                    <a:cxn ang="0">
+                      <a:pos x="connsiteX2" y="connsiteY2"/>
+                    </a:cxn>
+                    <a:cxn ang="0">
+                      <a:pos x="connsiteX3" y="connsiteY3"/>
+                    </a:cxn>
+                  </a:cxnLst>
+                  <a:rect l="l" t="t" r="r" b="b"/>
+                  <a:pathLst>
+                    <a:path w="226400" h="171466">
+                      <a:moveTo>
+                        <a:pt x="0" y="32920"/>
+                      </a:moveTo>
+                      <a:cubicBezTo>
+                        <a:pt x="60036" y="11368"/>
+                        <a:pt x="120073" y="-10183"/>
+                        <a:pt x="157018" y="5211"/>
+                      </a:cubicBezTo>
+                      <a:cubicBezTo>
+                        <a:pt x="193963" y="20605"/>
+                        <a:pt x="241685" y="97575"/>
+                        <a:pt x="221673" y="125284"/>
+                      </a:cubicBezTo>
+                      <a:cubicBezTo>
+                        <a:pt x="201661" y="152993"/>
+                        <a:pt x="119303" y="162229"/>
+                        <a:pt x="36945" y="171466"/>
+                      </a:cubicBezTo>
+                    </a:path>
+                  </a:pathLst>
+                </a:custGeom>
+                <a:ln w="19050">
+                  <a:solidFill>
+                    <a:srgbClr val="7030A0"/>
+                  </a:solidFill>
+                  <a:headEnd type="arrow" w="med" len="med"/>
+                  <a:tailEnd type="none" w="med" len="med"/>
+                </a:ln>
+              </p:spPr>
+              <p:style>
+                <a:lnRef idx="1">
+                  <a:schemeClr val="accent1"/>
+                </a:lnRef>
+                <a:fillRef idx="0">
+                  <a:schemeClr val="accent1"/>
+                </a:fillRef>
+                <a:effectRef idx="0">
+                  <a:schemeClr val="accent1"/>
+                </a:effectRef>
+                <a:fontRef idx="minor">
+                  <a:schemeClr val="tx1"/>
+                </a:fontRef>
+              </p:style>
+              <p:txBody>
+                <a:bodyPr rtlCol="0" anchor="ctr"/>
+                <a:lstStyle/>
+                <a:p>
+                  <a:pPr algn="ctr"/>
+                  <a:endParaRPr lang="en-SG"/>
+                </a:p>
+              </p:txBody>
+            </p:sp>
+            <p:sp>
+              <p:nvSpPr>
+                <p:cNvPr id="42" name="Rectangle 41"/>
+                <p:cNvSpPr/>
+                <p:nvPr/>
+              </p:nvSpPr>
+              <p:spPr>
+                <a:xfrm>
+                  <a:off x="1147403" y="5712513"/>
+                  <a:ext cx="98080" cy="169591"/>
+                </a:xfrm>
+                <a:prstGeom prst="rect">
+                  <a:avLst/>
+                </a:prstGeom>
+                <a:solidFill>
+                  <a:srgbClr val="7030A0"/>
+                </a:solidFill>
+                <a:ln>
+                  <a:solidFill>
+                    <a:schemeClr val="bg1"/>
+                  </a:solidFill>
+                </a:ln>
+                <a:effectLst/>
+              </p:spPr>
+              <p:style>
+                <a:lnRef idx="1">
+                  <a:schemeClr val="accent3"/>
+                </a:lnRef>
+                <a:fillRef idx="2">
+                  <a:schemeClr val="accent3"/>
+                </a:fillRef>
+                <a:effectRef idx="1">
+                  <a:schemeClr val="accent3"/>
+                </a:effectRef>
+                <a:fontRef idx="minor">
+                  <a:schemeClr val="dk1"/>
+                </a:fontRef>
+              </p:style>
+              <p:txBody>
+                <a:bodyPr rtlCol="0" anchor="ctr"/>
+                <a:lstStyle/>
+                <a:p>
+                  <a:pPr algn="ctr"/>
+                  <a:endParaRPr lang="en-SG" sz="1400">
+                    <a:solidFill>
+                      <a:schemeClr val="dk1"/>
+                    </a:solidFill>
+                  </a:endParaRPr>
+                </a:p>
+              </p:txBody>
+            </p:sp>
+          </p:grpSp>
+          <p:sp>
+            <p:nvSpPr>
+              <p:cNvPr id="43" name="TextBox 42"/>
+              <p:cNvSpPr txBox="1"/>
+              <p:nvPr/>
+            </p:nvSpPr>
+            <p:spPr>
+              <a:xfrm>
+                <a:off x="194562" y="5444571"/>
+                <a:ext cx="794081" cy="430887"/>
+              </a:xfrm>
+              <a:prstGeom prst="rect">
+                <a:avLst/>
+              </a:prstGeom>
+              <a:noFill/>
+            </p:spPr>
+            <p:txBody>
+              <a:bodyPr wrap="square" lIns="0" tIns="0" rIns="0" bIns="0" rtlCol="0">
+                <a:spAutoFit/>
+              </a:bodyPr>
+              <a:lstStyle/>
+              <a:p>
+                <a:pPr algn="r"/>
+                <a:r>
+                  <a:rPr lang="en-US" sz="1400" dirty="0" smtClean="0">
+                    <a:solidFill>
+                      <a:srgbClr val="7030A0"/>
+                    </a:solidFill>
+                  </a:rPr>
+                  <a:t>Update </a:t>
+                </a:r>
+                <a:r>
+                  <a:rPr lang="en-US" sz="1400" dirty="0" smtClean="0">
+                    <a:solidFill>
+                      <a:srgbClr val="7030A0"/>
+                    </a:solidFill>
+                  </a:rPr>
+                  <a:t>task list</a:t>
+                </a:r>
+                <a:endParaRPr lang="en-US" sz="1400" dirty="0">
+                  <a:solidFill>
+                    <a:srgbClr val="7030A0"/>
+                  </a:solidFill>
+                </a:endParaRPr>
+              </a:p>
+            </p:txBody>
+          </p:sp>
+        </p:grpSp>
+        <p:sp>
+          <p:nvSpPr>
+            <p:cNvPr id="65" name="TextBox 64"/>
+            <p:cNvSpPr txBox="1"/>
+            <p:nvPr/>
+          </p:nvSpPr>
+          <p:spPr>
+            <a:xfrm>
+              <a:off x="2152640" y="4654580"/>
+              <a:ext cx="2438400" cy="215444"/>
+            </a:xfrm>
+            <a:prstGeom prst="rect">
+              <a:avLst/>
+            </a:prstGeom>
+            <a:noFill/>
+          </p:spPr>
+          <p:txBody>
+            <a:bodyPr wrap="square" lIns="0" tIns="0" rIns="0" bIns="0" rtlCol="0">
+              <a:spAutoFit/>
+            </a:bodyPr>
+            <a:lstStyle/>
+            <a:p>
+              <a:r>
+                <a:rPr lang="en-US" sz="1400" dirty="0" smtClean="0">
+                  <a:solidFill>
+                    <a:schemeClr val="accent5">
+                      <a:lumMod val="75000"/>
+                    </a:schemeClr>
+                  </a:solidFill>
+                </a:rPr>
+                <a:t>post(</a:t>
+              </a:r>
+              <a:r>
+                <a:rPr lang="en-US" sz="1400" dirty="0" err="1" smtClean="0">
+                  <a:solidFill>
+                    <a:schemeClr val="accent5">
+                      <a:lumMod val="75000"/>
+                    </a:schemeClr>
+                  </a:solidFill>
+                </a:rPr>
+                <a:t>ToDoListChangedEvent</a:t>
+              </a:r>
+              <a:r>
+                <a:rPr lang="en-US" sz="1400" dirty="0" smtClean="0">
+                  <a:solidFill>
+                    <a:schemeClr val="accent5">
+                      <a:lumMod val="75000"/>
+                    </a:schemeClr>
+                  </a:solidFill>
+                </a:rPr>
+                <a:t>)</a:t>
+              </a:r>
+              <a:endParaRPr lang="en-US" sz="1400" dirty="0">
+                <a:solidFill>
+                  <a:schemeClr val="accent5">
+                    <a:lumMod val="75000"/>
+                  </a:schemeClr>
+                </a:solidFill>
+              </a:endParaRPr>
+            </a:p>
+          </p:txBody>
+        </p:sp>
+        <p:cxnSp>
+          <p:nvCxnSpPr>
+            <p:cNvPr id="66" name="Straight Arrow Connector 65"/>
+            <p:cNvCxnSpPr/>
+            <p:nvPr/>
+          </p:nvCxnSpPr>
+          <p:spPr>
+            <a:xfrm>
+              <a:off x="2022602" y="4928126"/>
+              <a:ext cx="2396998" cy="0"/>
+            </a:xfrm>
+            <a:prstGeom prst="straightConnector1">
+              <a:avLst/>
+            </a:prstGeom>
+            <a:ln w="19050">
+              <a:solidFill>
+                <a:srgbClr val="7030A0"/>
+              </a:solidFill>
+              <a:tailEnd type="arrow"/>
+            </a:ln>
+          </p:spPr>
+          <p:style>
+            <a:lnRef idx="1">
+              <a:schemeClr val="accent1"/>
+            </a:lnRef>
+            <a:fillRef idx="0">
+              <a:schemeClr val="accent1"/>
+            </a:fillRef>
+            <a:effectRef idx="0">
+              <a:schemeClr val="accent1"/>
+            </a:effectRef>
+            <a:fontRef idx="minor">
+              <a:schemeClr val="tx1"/>
+            </a:fontRef>
+          </p:style>
+        </p:cxnSp>
+        <p:cxnSp>
+          <p:nvCxnSpPr>
+            <p:cNvPr id="67" name="Straight Arrow Connector 66"/>
+            <p:cNvCxnSpPr>
+              <a:endCxn id="13" idx="2"/>
+            </p:cNvCxnSpPr>
+            <p:nvPr/>
+          </p:nvCxnSpPr>
+          <p:spPr>
+            <a:xfrm>
+              <a:off x="2057792" y="5257800"/>
+              <a:ext cx="2438282" cy="0"/>
+            </a:xfrm>
+            <a:prstGeom prst="straightConnector1">
+              <a:avLst/>
+            </a:prstGeom>
+            <a:ln w="19050">
+              <a:solidFill>
+                <a:schemeClr val="accent5">
+                  <a:lumMod val="75000"/>
+                </a:schemeClr>
+              </a:solidFill>
+              <a:prstDash val="sysDash"/>
+              <a:headEnd type="arrow" w="med" len="med"/>
+              <a:tailEnd type="none" w="med" len="med"/>
+            </a:ln>
+          </p:spPr>
+          <p:style>
+            <a:lnRef idx="1">
+              <a:schemeClr val="accent1"/>
+            </a:lnRef>
+            <a:fillRef idx="0">
+              <a:schemeClr val="accent1"/>
+            </a:fillRef>
+            <a:effectRef idx="0">
+              <a:schemeClr val="accent1"/>
+            </a:effectRef>
+            <a:fontRef idx="minor">
+              <a:schemeClr val="tx1"/>
+            </a:fontRef>
+          </p:style>
+        </p:cxnSp>
+      </p:grpSp>
     </p:spTree>
     <p:extLst>
       <p:ext uri="{BB962C8B-B14F-4D97-AF65-F5344CB8AC3E}">

</xml_diff>